<commit_message>
fixed space not transitioning to final transition, fixed continue button in final transition. Added nicks scenarios to score.
</commit_message>
<xml_diff>
--- a/Documents/Poster/Poster.pptx
+++ b/Documents/Poster/Poster.pptx
@@ -109,7 +109,7 @@
   </p:defaultTextStyle>
   <p:extLst>
     <p:ext uri="{EFAFB233-063F-42B5-8137-9DF3F51BA10A}">
-      <p15:sldGuideLst xmlns:p15="http://schemas.microsoft.com/office/powerpoint/2012/main" xmlns="">
+      <p15:sldGuideLst xmlns:p15="http://schemas.microsoft.com/office/powerpoint/2012/main">
         <p15:guide id="1" orient="horz" pos="3318">
           <p15:clr>
             <a:srgbClr val="A4A3A4"/>
@@ -163,7 +163,7 @@
       </p15:sldGuideLst>
     </p:ext>
     <p:ext uri="{2D200454-40CA-4A62-9FC3-DE9A4176ACB9}">
-      <p15:notesGuideLst xmlns:p15="http://schemas.microsoft.com/office/powerpoint/2012/main" xmlns="">
+      <p15:notesGuideLst xmlns:p15="http://schemas.microsoft.com/office/powerpoint/2012/main">
         <p15:guide id="1" orient="horz" pos="13681">
           <p15:clr>
             <a:srgbClr val="A4A3A4"/>
@@ -272,7 +272,7 @@
             <a:fld id="{E6CC2317-6751-4CD4-9995-8782DD78E936}" type="datetimeFigureOut">
               <a:rPr lang="en-US" smtClean="0"/>
               <a:pPr/>
-              <a:t>4/3/2017</a:t>
+              <a:t>4/4/2017</a:t>
             </a:fld>
             <a:endParaRPr lang="en-US" dirty="0"/>
           </a:p>
@@ -338,38 +338,37 @@
           <a:p>
             <a:pPr lvl="0"/>
             <a:r>
-              <a:rPr lang="en-US" smtClean="0"/>
+              <a:rPr lang="en-US"/>
               <a:t>Click to edit Master text styles</a:t>
             </a:r>
           </a:p>
           <a:p>
             <a:pPr lvl="1"/>
             <a:r>
-              <a:rPr lang="en-US" smtClean="0"/>
+              <a:rPr lang="en-US"/>
               <a:t>Second level</a:t>
             </a:r>
           </a:p>
           <a:p>
             <a:pPr lvl="2"/>
             <a:r>
-              <a:rPr lang="en-US" smtClean="0"/>
+              <a:rPr lang="en-US"/>
               <a:t>Third level</a:t>
             </a:r>
           </a:p>
           <a:p>
             <a:pPr lvl="3"/>
             <a:r>
-              <a:rPr lang="en-US" smtClean="0"/>
+              <a:rPr lang="en-US"/>
               <a:t>Fourth level</a:t>
             </a:r>
           </a:p>
           <a:p>
             <a:pPr lvl="4"/>
             <a:r>
-              <a:rPr lang="en-US" smtClean="0"/>
+              <a:rPr lang="en-US"/>
               <a:t>Fifth level</a:t>
             </a:r>
-            <a:endParaRPr lang="en-US"/>
           </a:p>
         </p:txBody>
       </p:sp>
@@ -443,7 +442,7 @@
     </p:spTree>
     <p:extLst>
       <p:ext uri="{BB962C8B-B14F-4D97-AF65-F5344CB8AC3E}">
-        <p14:creationId xmlns:p14="http://schemas.microsoft.com/office/powerpoint/2010/main" xmlns="" val="481019597"/>
+        <p14:creationId xmlns:p14="http://schemas.microsoft.com/office/powerpoint/2010/main" val="481019597"/>
       </p:ext>
     </p:extLst>
   </p:cSld>
@@ -620,7 +619,7 @@
     </p:spTree>
     <p:extLst>
       <p:ext uri="{BB962C8B-B14F-4D97-AF65-F5344CB8AC3E}">
-        <p14:creationId xmlns:p14="http://schemas.microsoft.com/office/powerpoint/2010/main" xmlns="" val="1217413623"/>
+        <p14:creationId xmlns:p14="http://schemas.microsoft.com/office/powerpoint/2010/main" val="1217413623"/>
       </p:ext>
     </p:extLst>
   </p:cSld>
@@ -701,10 +700,9 @@
           </a:lstStyle>
           <a:p>
             <a:r>
-              <a:rPr lang="en-US" dirty="0" smtClean="0"/>
+              <a:rPr lang="en-US" dirty="0"/>
               <a:t>Click here to add the poster title</a:t>
             </a:r>
-            <a:endParaRPr lang="en-US" dirty="0"/>
           </a:p>
         </p:txBody>
       </p:sp>
@@ -762,10 +760,9 @@
           <a:p>
             <a:pPr lvl="0"/>
             <a:r>
-              <a:rPr lang="en-US" dirty="0" smtClean="0"/>
+              <a:rPr lang="en-US" dirty="0"/>
               <a:t>Type in or paste your text here</a:t>
             </a:r>
-            <a:endParaRPr lang="en-US" dirty="0"/>
           </a:p>
         </p:txBody>
       </p:sp>
@@ -810,10 +807,9 @@
           <a:p>
             <a:pPr lvl="0"/>
             <a:r>
-              <a:rPr lang="en-US" dirty="0" smtClean="0"/>
+              <a:rPr lang="en-US" dirty="0"/>
               <a:t>(click to edit) INTRODUCTION or ABSTRACT</a:t>
             </a:r>
-            <a:endParaRPr lang="en-US" dirty="0"/>
           </a:p>
         </p:txBody>
       </p:sp>
@@ -850,10 +846,9 @@
           </a:lstStyle>
           <a:p>
             <a:r>
-              <a:rPr lang="en-US" dirty="0" smtClean="0"/>
+              <a:rPr lang="en-US" dirty="0"/>
               <a:t>LOGO</a:t>
             </a:r>
-            <a:endParaRPr lang="en-US" dirty="0"/>
           </a:p>
         </p:txBody>
       </p:sp>
@@ -890,10 +885,9 @@
           </a:lstStyle>
           <a:p>
             <a:r>
-              <a:rPr lang="en-US" dirty="0" smtClean="0"/>
+              <a:rPr lang="en-US" dirty="0"/>
               <a:t>LOGO</a:t>
             </a:r>
-            <a:endParaRPr lang="en-US" dirty="0"/>
           </a:p>
         </p:txBody>
       </p:sp>
@@ -938,10 +932,9 @@
           <a:p>
             <a:pPr lvl="0"/>
             <a:r>
-              <a:rPr lang="en-US" dirty="0" smtClean="0"/>
+              <a:rPr lang="en-US" dirty="0"/>
               <a:t>(click to edit)  OBJECTIVES</a:t>
             </a:r>
-            <a:endParaRPr lang="en-US" dirty="0"/>
           </a:p>
         </p:txBody>
       </p:sp>
@@ -999,10 +992,9 @@
           <a:p>
             <a:pPr lvl="0"/>
             <a:r>
-              <a:rPr lang="en-US" dirty="0" smtClean="0"/>
+              <a:rPr lang="en-US" dirty="0"/>
               <a:t>Type in or paste your text here</a:t>
             </a:r>
-            <a:endParaRPr lang="en-US" dirty="0"/>
           </a:p>
         </p:txBody>
       </p:sp>
@@ -1047,10 +1039,9 @@
           <a:p>
             <a:pPr lvl="0"/>
             <a:r>
-              <a:rPr lang="en-US" dirty="0" smtClean="0"/>
+              <a:rPr lang="en-US" dirty="0"/>
               <a:t>(click to edit)  MATERIALS &amp; METHODS</a:t>
             </a:r>
-            <a:endParaRPr lang="en-US" dirty="0"/>
           </a:p>
         </p:txBody>
       </p:sp>
@@ -1108,10 +1099,9 @@
           <a:p>
             <a:pPr lvl="0"/>
             <a:r>
-              <a:rPr lang="en-US" dirty="0" smtClean="0"/>
+              <a:rPr lang="en-US" dirty="0"/>
               <a:t>Type in or paste your text here</a:t>
             </a:r>
-            <a:endParaRPr lang="en-US" dirty="0"/>
           </a:p>
         </p:txBody>
       </p:sp>
@@ -1156,10 +1146,9 @@
           <a:p>
             <a:pPr lvl="0"/>
             <a:r>
-              <a:rPr lang="en-US" dirty="0" smtClean="0"/>
+              <a:rPr lang="en-US" dirty="0"/>
               <a:t>(click to edit)  RESULTS</a:t>
             </a:r>
-            <a:endParaRPr lang="en-US" dirty="0"/>
           </a:p>
         </p:txBody>
       </p:sp>
@@ -1204,10 +1193,9 @@
           <a:p>
             <a:pPr lvl="0"/>
             <a:r>
-              <a:rPr lang="en-US" dirty="0" smtClean="0"/>
+              <a:rPr lang="en-US" dirty="0"/>
               <a:t>(click to edit)  CONCLUSIONS</a:t>
             </a:r>
-            <a:endParaRPr lang="en-US" dirty="0"/>
           </a:p>
         </p:txBody>
       </p:sp>
@@ -1265,10 +1253,9 @@
           <a:p>
             <a:pPr lvl="0"/>
             <a:r>
-              <a:rPr lang="en-US" dirty="0" smtClean="0"/>
+              <a:rPr lang="en-US" dirty="0"/>
               <a:t>Type in or paste your text here</a:t>
             </a:r>
-            <a:endParaRPr lang="en-US" dirty="0"/>
           </a:p>
         </p:txBody>
       </p:sp>
@@ -1313,10 +1300,9 @@
           <a:p>
             <a:pPr lvl="0"/>
             <a:r>
-              <a:rPr lang="en-US" dirty="0" smtClean="0"/>
+              <a:rPr lang="en-US" dirty="0"/>
               <a:t>(click to edit)  REFERENCES</a:t>
             </a:r>
-            <a:endParaRPr lang="en-US" dirty="0"/>
           </a:p>
         </p:txBody>
       </p:sp>
@@ -1374,10 +1360,9 @@
           <a:p>
             <a:pPr lvl="0"/>
             <a:r>
-              <a:rPr lang="en-US" dirty="0" smtClean="0"/>
+              <a:rPr lang="en-US" dirty="0"/>
               <a:t>Type in or paste your text here</a:t>
             </a:r>
-            <a:endParaRPr lang="en-US" dirty="0"/>
           </a:p>
         </p:txBody>
       </p:sp>
@@ -1422,10 +1407,9 @@
           <a:p>
             <a:pPr lvl="0"/>
             <a:r>
-              <a:rPr lang="en-US" dirty="0" smtClean="0"/>
+              <a:rPr lang="en-US" dirty="0"/>
               <a:t>(click to edit)  ACKNOWLEDGEMENTS or  CONTACT</a:t>
             </a:r>
-            <a:endParaRPr lang="en-US" dirty="0"/>
           </a:p>
         </p:txBody>
       </p:sp>
@@ -1483,10 +1467,9 @@
           <a:p>
             <a:pPr lvl="0"/>
             <a:r>
-              <a:rPr lang="en-US" dirty="0" smtClean="0"/>
+              <a:rPr lang="en-US" dirty="0"/>
               <a:t>Type in or paste your text here</a:t>
             </a:r>
-            <a:endParaRPr lang="en-US" dirty="0"/>
           </a:p>
         </p:txBody>
       </p:sp>
@@ -1544,10 +1527,9 @@
           <a:p>
             <a:pPr lvl="0"/>
             <a:r>
-              <a:rPr lang="en-US" dirty="0" smtClean="0"/>
+              <a:rPr lang="en-US" dirty="0"/>
               <a:t>Type in or paste your text here</a:t>
             </a:r>
-            <a:endParaRPr lang="en-US" dirty="0"/>
           </a:p>
         </p:txBody>
       </p:sp>
@@ -1605,10 +1587,9 @@
           <a:p>
             <a:pPr lvl="0"/>
             <a:r>
-              <a:rPr lang="en-US" dirty="0" smtClean="0"/>
+              <a:rPr lang="en-US" dirty="0"/>
               <a:t>TEXT PLACEHOLDER</a:t>
             </a:r>
-            <a:endParaRPr lang="en-US" dirty="0"/>
           </a:p>
         </p:txBody>
       </p:sp>
@@ -1654,10 +1635,9 @@
           </a:lstStyle>
           <a:p>
             <a:r>
-              <a:rPr lang="en-US" dirty="0" smtClean="0"/>
+              <a:rPr lang="en-US" dirty="0"/>
               <a:t>PICTURE PLACEHOLDER</a:t>
             </a:r>
-            <a:endParaRPr lang="en-US" dirty="0"/>
           </a:p>
         </p:txBody>
       </p:sp>
@@ -1716,10 +1696,9 @@
           <a:p>
             <a:pPr lvl="0"/>
             <a:r>
-              <a:rPr lang="en-US" dirty="0" smtClean="0"/>
+              <a:rPr lang="en-US" dirty="0"/>
               <a:t>Click here to add authors</a:t>
             </a:r>
-            <a:endParaRPr lang="en-US" dirty="0"/>
           </a:p>
         </p:txBody>
       </p:sp>
@@ -1778,10 +1757,9 @@
           <a:p>
             <a:pPr lvl="0"/>
             <a:r>
-              <a:rPr lang="en-US" dirty="0" smtClean="0"/>
+              <a:rPr lang="en-US" dirty="0"/>
               <a:t>Click here to add authors</a:t>
             </a:r>
-            <a:endParaRPr lang="en-US" dirty="0"/>
           </a:p>
         </p:txBody>
       </p:sp>
@@ -1827,10 +1805,9 @@
           </a:lstStyle>
           <a:p>
             <a:r>
-              <a:rPr lang="en-US" dirty="0" smtClean="0"/>
+              <a:rPr lang="en-US" dirty="0"/>
               <a:t>PICTURE PLACEHOLDER</a:t>
             </a:r>
-            <a:endParaRPr lang="en-US" dirty="0"/>
           </a:p>
         </p:txBody>
       </p:sp>
@@ -1876,10 +1853,9 @@
           </a:lstStyle>
           <a:p>
             <a:r>
-              <a:rPr lang="en-US" dirty="0" smtClean="0"/>
+              <a:rPr lang="en-US" dirty="0"/>
               <a:t>PICTURE PLACEHOLDER</a:t>
             </a:r>
-            <a:endParaRPr lang="en-US" dirty="0"/>
           </a:p>
         </p:txBody>
       </p:sp>
@@ -1925,10 +1901,9 @@
           </a:lstStyle>
           <a:p>
             <a:r>
-              <a:rPr lang="en-US" dirty="0" smtClean="0"/>
+              <a:rPr lang="en-US" dirty="0"/>
               <a:t>PICTURE PLACEHOLDER</a:t>
             </a:r>
-            <a:endParaRPr lang="en-US" dirty="0"/>
           </a:p>
         </p:txBody>
       </p:sp>
@@ -1974,10 +1949,9 @@
           </a:lstStyle>
           <a:p>
             <a:r>
-              <a:rPr lang="en-US" dirty="0" smtClean="0"/>
+              <a:rPr lang="en-US" dirty="0"/>
               <a:t>PICTURE PLACEHOLDER</a:t>
             </a:r>
-            <a:endParaRPr lang="en-US" dirty="0"/>
           </a:p>
         </p:txBody>
       </p:sp>
@@ -2023,10 +1997,9 @@
           </a:lstStyle>
           <a:p>
             <a:r>
-              <a:rPr lang="en-US" dirty="0" smtClean="0"/>
+              <a:rPr lang="en-US" dirty="0"/>
               <a:t>PICTURE PLACEHOLDER</a:t>
             </a:r>
-            <a:endParaRPr lang="en-US" dirty="0"/>
           </a:p>
         </p:txBody>
       </p:sp>
@@ -2072,10 +2045,9 @@
           </a:lstStyle>
           <a:p>
             <a:r>
-              <a:rPr lang="en-US" dirty="0" smtClean="0"/>
+              <a:rPr lang="en-US" dirty="0"/>
               <a:t>PICTURE PLACEHOLDER</a:t>
             </a:r>
-            <a:endParaRPr lang="en-US" dirty="0"/>
           </a:p>
         </p:txBody>
       </p:sp>
@@ -2121,10 +2093,9 @@
           </a:lstStyle>
           <a:p>
             <a:r>
-              <a:rPr lang="en-US" dirty="0" smtClean="0"/>
+              <a:rPr lang="en-US" dirty="0"/>
               <a:t>PICTURE PLACEHOLDER</a:t>
             </a:r>
-            <a:endParaRPr lang="en-US" dirty="0"/>
           </a:p>
         </p:txBody>
       </p:sp>
@@ -2169,10 +2140,9 @@
           <a:p>
             <a:pPr lvl="0"/>
             <a:r>
-              <a:rPr lang="en-US" dirty="0" smtClean="0"/>
+              <a:rPr lang="en-US" dirty="0"/>
               <a:t>SECTION HEADER PLACEHOLDER</a:t>
             </a:r>
-            <a:endParaRPr lang="en-US" dirty="0"/>
           </a:p>
         </p:txBody>
       </p:sp>
@@ -2230,10 +2200,9 @@
           <a:p>
             <a:pPr lvl="0"/>
             <a:r>
-              <a:rPr lang="en-US" dirty="0" smtClean="0"/>
+              <a:rPr lang="en-US" dirty="0"/>
               <a:t>TEXT PLACEHOLDER</a:t>
             </a:r>
-            <a:endParaRPr lang="en-US" dirty="0"/>
           </a:p>
         </p:txBody>
       </p:sp>
@@ -2291,10 +2260,9 @@
           <a:p>
             <a:pPr lvl="0"/>
             <a:r>
-              <a:rPr lang="en-US" dirty="0" smtClean="0"/>
+              <a:rPr lang="en-US" dirty="0"/>
               <a:t>TEXT PLACEHOLDER</a:t>
             </a:r>
-            <a:endParaRPr lang="en-US" dirty="0"/>
           </a:p>
         </p:txBody>
       </p:sp>
@@ -2352,10 +2320,9 @@
           <a:p>
             <a:pPr lvl="0"/>
             <a:r>
-              <a:rPr lang="en-US" dirty="0" smtClean="0"/>
+              <a:rPr lang="en-US" dirty="0"/>
               <a:t>TEXT PLACEHOLDER</a:t>
             </a:r>
-            <a:endParaRPr lang="en-US" dirty="0"/>
           </a:p>
         </p:txBody>
       </p:sp>
@@ -2413,10 +2380,9 @@
           <a:p>
             <a:pPr lvl="0"/>
             <a:r>
-              <a:rPr lang="en-US" dirty="0" smtClean="0"/>
+              <a:rPr lang="en-US" dirty="0"/>
               <a:t>TEXT PLACEHOLDER</a:t>
             </a:r>
-            <a:endParaRPr lang="en-US" dirty="0"/>
           </a:p>
         </p:txBody>
       </p:sp>
@@ -2474,10 +2440,9 @@
           <a:p>
             <a:pPr lvl="0"/>
             <a:r>
-              <a:rPr lang="en-US" dirty="0" smtClean="0"/>
+              <a:rPr lang="en-US" dirty="0"/>
               <a:t>TEXT PLACEHOLDER</a:t>
             </a:r>
-            <a:endParaRPr lang="en-US" dirty="0"/>
           </a:p>
         </p:txBody>
       </p:sp>
@@ -2535,10 +2500,9 @@
           <a:p>
             <a:pPr lvl="0"/>
             <a:r>
-              <a:rPr lang="en-US" dirty="0" smtClean="0"/>
+              <a:rPr lang="en-US" dirty="0"/>
               <a:t>TEXT PLACEHOLDER</a:t>
             </a:r>
-            <a:endParaRPr lang="en-US" dirty="0"/>
           </a:p>
         </p:txBody>
       </p:sp>
@@ -2596,10 +2560,9 @@
           <a:p>
             <a:pPr lvl="0"/>
             <a:r>
-              <a:rPr lang="en-US" dirty="0" smtClean="0"/>
+              <a:rPr lang="en-US" dirty="0"/>
               <a:t>TEXT PLACEHOLDER</a:t>
             </a:r>
-            <a:endParaRPr lang="en-US" dirty="0"/>
           </a:p>
         </p:txBody>
       </p:sp>
@@ -2657,10 +2620,9 @@
           <a:p>
             <a:pPr lvl="0"/>
             <a:r>
-              <a:rPr lang="en-US" dirty="0" smtClean="0"/>
+              <a:rPr lang="en-US" dirty="0"/>
               <a:t>TEXT PLACEHOLDER</a:t>
             </a:r>
-            <a:endParaRPr lang="en-US" dirty="0"/>
           </a:p>
         </p:txBody>
       </p:sp>
@@ -2705,10 +2667,9 @@
           <a:p>
             <a:pPr lvl="0"/>
             <a:r>
-              <a:rPr lang="en-US" dirty="0" smtClean="0"/>
+              <a:rPr lang="en-US" dirty="0"/>
               <a:t>SECTION HEADER PLACEHOLDER</a:t>
             </a:r>
-            <a:endParaRPr lang="en-US" dirty="0"/>
           </a:p>
         </p:txBody>
       </p:sp>
@@ -2753,10 +2714,9 @@
           <a:p>
             <a:pPr lvl="0"/>
             <a:r>
-              <a:rPr lang="en-US" dirty="0" smtClean="0"/>
+              <a:rPr lang="en-US" dirty="0"/>
               <a:t>SECTION HEADER PLACEHOLDER</a:t>
             </a:r>
-            <a:endParaRPr lang="en-US" dirty="0"/>
           </a:p>
         </p:txBody>
       </p:sp>
@@ -2801,10 +2761,9 @@
           <a:p>
             <a:pPr lvl="0"/>
             <a:r>
-              <a:rPr lang="en-US" dirty="0" smtClean="0"/>
+              <a:rPr lang="en-US" dirty="0"/>
               <a:t>SECTION HEADER PLACEHOLDER</a:t>
             </a:r>
-            <a:endParaRPr lang="en-US" dirty="0"/>
           </a:p>
         </p:txBody>
       </p:sp>
@@ -2849,10 +2808,9 @@
           <a:p>
             <a:pPr lvl="0"/>
             <a:r>
-              <a:rPr lang="en-US" dirty="0" smtClean="0"/>
+              <a:rPr lang="en-US" dirty="0"/>
               <a:t>SECTION HEADER PLACEHOLDER</a:t>
             </a:r>
-            <a:endParaRPr lang="en-US" dirty="0"/>
           </a:p>
         </p:txBody>
       </p:sp>
@@ -2897,10 +2855,9 @@
           <a:p>
             <a:pPr lvl="0"/>
             <a:r>
-              <a:rPr lang="en-US" dirty="0" smtClean="0"/>
+              <a:rPr lang="en-US" dirty="0"/>
               <a:t>SECTION HEADER PLACEHOLDER</a:t>
             </a:r>
-            <a:endParaRPr lang="en-US" dirty="0"/>
           </a:p>
         </p:txBody>
       </p:sp>
@@ -2945,10 +2902,9 @@
           <a:p>
             <a:pPr lvl="0"/>
             <a:r>
-              <a:rPr lang="en-US" dirty="0" smtClean="0"/>
+              <a:rPr lang="en-US" dirty="0"/>
               <a:t>SECTION HEADER PLACEHOLDER</a:t>
             </a:r>
-            <a:endParaRPr lang="en-US" dirty="0"/>
           </a:p>
         </p:txBody>
       </p:sp>
@@ -2993,10 +2949,9 @@
           <a:p>
             <a:pPr lvl="0"/>
             <a:r>
-              <a:rPr lang="en-US" dirty="0" smtClean="0"/>
+              <a:rPr lang="en-US" dirty="0"/>
               <a:t>SECTION HEADER PLACEHOLDER</a:t>
             </a:r>
-            <a:endParaRPr lang="en-US" dirty="0"/>
           </a:p>
         </p:txBody>
       </p:sp>
@@ -3041,10 +2996,9 @@
           <a:p>
             <a:pPr lvl="0"/>
             <a:r>
-              <a:rPr lang="en-US" dirty="0" smtClean="0"/>
+              <a:rPr lang="en-US" dirty="0"/>
               <a:t>SECTION HEADER PLACEHOLDER</a:t>
             </a:r>
-            <a:endParaRPr lang="en-US" dirty="0"/>
           </a:p>
         </p:txBody>
       </p:sp>
@@ -3161,13 +3115,6 @@
   <p:clrMapOvr>
     <a:overrideClrMapping bg1="lt1" tx1="dk1" bg2="lt2" tx2="dk2" accent1="accent1" accent2="accent2" accent3="accent3" accent4="accent4" accent5="accent5" accent6="accent6" hlink="hlink" folHlink="folHlink"/>
   </p:clrMapOvr>
-  <p:timing>
-    <p:tnLst>
-      <p:par>
-        <p:cTn id="1" dur="indefinite" restart="never" nodeType="tmRoot"/>
-      </p:par>
-    </p:tnLst>
-  </p:timing>
 </p:sldLayout>
 </file>
 
@@ -3239,7 +3186,7 @@
           <a:p>
             <a:pPr algn="ctr"/>
             <a:r>
-              <a:rPr lang="en-US" sz="4000" b="1" dirty="0" smtClean="0">
+              <a:rPr lang="en-US" sz="4000" b="1" dirty="0">
                 <a:solidFill>
                   <a:schemeClr val="bg1"/>
                 </a:solidFill>
@@ -3248,7 +3195,7 @@
               <a:t>QUICK</a:t>
             </a:r>
             <a:r>
-              <a:rPr lang="en-US" sz="4000" b="1" baseline="0" dirty="0" smtClean="0">
+              <a:rPr lang="en-US" sz="4000" b="1" baseline="0" dirty="0">
                 <a:solidFill>
                   <a:schemeClr val="bg1"/>
                 </a:solidFill>
@@ -3256,7 +3203,7 @@
               </a:rPr>
               <a:t> TIPS</a:t>
             </a:r>
-            <a:endParaRPr lang="en-US" sz="4000" b="1" dirty="0" smtClean="0">
+            <a:endParaRPr lang="en-US" sz="4000" b="1" dirty="0">
               <a:solidFill>
                 <a:schemeClr val="bg1"/>
               </a:solidFill>
@@ -3266,7 +3213,7 @@
           <a:p>
             <a:pPr algn="ctr"/>
             <a:r>
-              <a:rPr lang="en-US" sz="4000" b="1" dirty="0" smtClean="0">
+              <a:rPr lang="en-US" sz="4000" b="1" dirty="0">
                 <a:solidFill>
                   <a:srgbClr val="FFFF00"/>
                 </a:solidFill>
@@ -3277,36 +3224,36 @@
           </a:p>
           <a:p>
             <a:pPr algn="ctr"/>
-            <a:endParaRPr lang="en-US" sz="3200" b="1" dirty="0" smtClean="0">
+            <a:endParaRPr lang="en-US" sz="3200" b="1" dirty="0">
               <a:latin typeface="Trebuchet MS" pitchFamily="34" charset="0"/>
             </a:endParaRPr>
           </a:p>
           <a:p>
             <a:pPr defTabSz="3134780"/>
             <a:r>
-              <a:rPr lang="en-US" sz="3200" dirty="0" smtClean="0">
+              <a:rPr lang="en-US" sz="3200" dirty="0">
                 <a:latin typeface="Trebuchet MS" pitchFamily="34" charset="0"/>
               </a:rPr>
               <a:t>This PowerPoint</a:t>
             </a:r>
             <a:r>
-              <a:rPr lang="en-US" sz="3200" baseline="0" dirty="0" smtClean="0">
+              <a:rPr lang="en-US" sz="3200" baseline="0" dirty="0">
                 <a:latin typeface="Trebuchet MS" pitchFamily="34" charset="0"/>
               </a:rPr>
               <a:t> template requires basic PowerPoint (version 2007 or newer) skills. Below is a list of commonly asked questions specific to this template. </a:t>
             </a:r>
             <a:br>
-              <a:rPr lang="en-US" sz="3200" baseline="0" dirty="0" smtClean="0">
+              <a:rPr lang="en-US" sz="3200" baseline="0" dirty="0">
                 <a:latin typeface="Trebuchet MS" pitchFamily="34" charset="0"/>
               </a:rPr>
             </a:br>
             <a:r>
-              <a:rPr lang="en-US" sz="3200" baseline="0" dirty="0" smtClean="0">
+              <a:rPr lang="en-US" sz="3200" baseline="0" dirty="0">
                 <a:latin typeface="Trebuchet MS" pitchFamily="34" charset="0"/>
               </a:rPr>
               <a:t>If you are using an older version of PowerPoint some template features may not work properly.</a:t>
             </a:r>
-            <a:endParaRPr lang="en-US" sz="4000" b="1" dirty="0" smtClean="0">
+            <a:endParaRPr lang="en-US" sz="4000" b="1" dirty="0">
               <a:solidFill>
                 <a:srgbClr val="FFFF00"/>
               </a:solidFill>
@@ -3315,7 +3262,7 @@
           </a:p>
           <a:p>
             <a:pPr defTabSz="3134780"/>
-            <a:endParaRPr lang="en-US" sz="4000" b="1" dirty="0" smtClean="0">
+            <a:endParaRPr lang="en-US" sz="4000" b="1" dirty="0">
               <a:solidFill>
                 <a:srgbClr val="FFFF00"/>
               </a:solidFill>
@@ -3325,7 +3272,7 @@
           <a:p>
             <a:pPr algn="ctr"/>
             <a:r>
-              <a:rPr lang="en-US" sz="4000" b="1" dirty="0" smtClean="0">
+              <a:rPr lang="en-US" sz="4000" b="1" dirty="0">
                 <a:solidFill>
                   <a:schemeClr val="bg1"/>
                 </a:solidFill>
@@ -3333,7 +3280,7 @@
               </a:rPr>
               <a:t>Using the template</a:t>
             </a:r>
-            <a:endParaRPr lang="en-US" sz="4000" b="1" baseline="0" dirty="0" smtClean="0">
+            <a:endParaRPr lang="en-US" sz="4000" b="1" baseline="0" dirty="0">
               <a:solidFill>
                 <a:schemeClr val="bg1"/>
               </a:solidFill>
@@ -3342,7 +3289,7 @@
           </a:p>
           <a:p>
             <a:pPr algn="ctr"/>
-            <a:endParaRPr lang="en-US" sz="3200" b="1" dirty="0" smtClean="0">
+            <a:endParaRPr lang="en-US" sz="3200" b="1" dirty="0">
               <a:solidFill>
                 <a:srgbClr val="FFFF00"/>
               </a:solidFill>
@@ -3368,7 +3315,7 @@
               <a:defRPr/>
             </a:pPr>
             <a:r>
-              <a:rPr lang="en-US" sz="3200" b="1" dirty="0" smtClean="0">
+              <a:rPr lang="en-US" sz="3200" b="1" dirty="0">
                 <a:solidFill>
                   <a:srgbClr val="FFFF00"/>
                 </a:solidFill>
@@ -3380,30 +3327,30 @@
           <a:p>
             <a:pPr defTabSz="3134780"/>
             <a:r>
-              <a:rPr lang="en-US" sz="3200" dirty="0" smtClean="0">
+              <a:rPr lang="en-US" sz="3200" dirty="0">
                 <a:latin typeface="Trebuchet MS" pitchFamily="34" charset="0"/>
               </a:rPr>
               <a:t>Go to the </a:t>
             </a:r>
             <a:r>
-              <a:rPr lang="en-US" sz="3200" baseline="0" dirty="0" smtClean="0">
+              <a:rPr lang="en-US" sz="3200" baseline="0" dirty="0">
                 <a:latin typeface="Trebuchet MS" pitchFamily="34" charset="0"/>
               </a:rPr>
               <a:t>VIEW menu and click on ZOOM to set your preferred magnification. This template is at 100% the size of the final poster. All text and graphics will be printed at 100% their size. To see what your poster will look like when printed, set the zoom to 100% and evaluate the quality of all your graphics before you submit your poster for printing.</a:t>
             </a:r>
             <a:br>
-              <a:rPr lang="en-US" sz="3200" baseline="0" dirty="0" smtClean="0">
+              <a:rPr lang="en-US" sz="3200" baseline="0" dirty="0">
                 <a:latin typeface="Trebuchet MS" pitchFamily="34" charset="0"/>
               </a:rPr>
             </a:br>
-            <a:endParaRPr lang="en-US" sz="3200" baseline="0" dirty="0" smtClean="0">
+            <a:endParaRPr lang="en-US" sz="3200" baseline="0" dirty="0">
               <a:latin typeface="Trebuchet MS" pitchFamily="34" charset="0"/>
             </a:endParaRPr>
           </a:p>
           <a:p>
             <a:pPr defTabSz="3134780"/>
             <a:r>
-              <a:rPr lang="en-US" sz="3200" b="1" dirty="0" smtClean="0">
+              <a:rPr lang="en-US" sz="3200" b="1" dirty="0">
                 <a:solidFill>
                   <a:srgbClr val="FFFF00"/>
                 </a:solidFill>
@@ -3415,31 +3362,31 @@
           <a:p>
             <a:pPr defTabSz="3134780"/>
             <a:r>
-              <a:rPr lang="en-US" sz="3200" baseline="0" dirty="0" smtClean="0">
+              <a:rPr lang="en-US" sz="3200" baseline="0" dirty="0">
                 <a:latin typeface="Trebuchet MS" pitchFamily="34" charset="0"/>
               </a:rPr>
               <a:t>To add text to this template click inside a placeholder and type in or paste your text. To move a placeholder, click on it </a:t>
             </a:r>
             <a:r>
-              <a:rPr lang="en-US" sz="3200" u="sng" baseline="0" dirty="0" smtClean="0">
+              <a:rPr lang="en-US" sz="3200" u="sng" baseline="0" dirty="0">
                 <a:latin typeface="Trebuchet MS" pitchFamily="34" charset="0"/>
               </a:rPr>
               <a:t>once</a:t>
             </a:r>
             <a:r>
-              <a:rPr lang="en-US" sz="3200" baseline="0" dirty="0" smtClean="0">
+              <a:rPr lang="en-US" sz="3200" baseline="0" dirty="0">
                 <a:latin typeface="Trebuchet MS" pitchFamily="34" charset="0"/>
               </a:rPr>
               <a:t> (to select it), place your cursor on its frame and your cursor will change to this symbol:         Then, click </a:t>
             </a:r>
             <a:r>
-              <a:rPr lang="en-US" sz="3200" u="sng" baseline="0" dirty="0" smtClean="0">
+              <a:rPr lang="en-US" sz="3200" u="sng" baseline="0" dirty="0">
                 <a:latin typeface="Trebuchet MS" pitchFamily="34" charset="0"/>
               </a:rPr>
               <a:t>once</a:t>
             </a:r>
             <a:r>
-              <a:rPr lang="en-US" sz="3200" baseline="0" dirty="0" smtClean="0">
+              <a:rPr lang="en-US" sz="3200" baseline="0" dirty="0">
                 <a:latin typeface="Trebuchet MS" pitchFamily="34" charset="0"/>
               </a:rPr>
               <a:t> and drag it to its new location where you can resize it as needed. Additional placeholders can be found on the left side of this template.</a:t>
@@ -3447,7 +3394,7 @@
           </a:p>
           <a:p>
             <a:pPr defTabSz="3134780"/>
-            <a:endParaRPr lang="en-US" sz="3200" b="1" baseline="0" dirty="0" smtClean="0">
+            <a:endParaRPr lang="en-US" sz="3200" b="1" baseline="0" dirty="0">
               <a:solidFill>
                 <a:srgbClr val="FFFF00"/>
               </a:solidFill>
@@ -3457,7 +3404,7 @@
           <a:p>
             <a:pPr defTabSz="3134780"/>
             <a:r>
-              <a:rPr lang="en-US" sz="3200" b="1" baseline="0" dirty="0" smtClean="0">
+              <a:rPr lang="en-US" sz="3200" b="1" baseline="0" dirty="0">
                 <a:solidFill>
                   <a:srgbClr val="FFFF00"/>
                 </a:solidFill>
@@ -3469,42 +3416,42 @@
           <a:p>
             <a:pPr defTabSz="3134780"/>
             <a:r>
-              <a:rPr lang="en-US" sz="3200" dirty="0" smtClean="0">
+              <a:rPr lang="en-US" sz="3200" dirty="0">
                 <a:latin typeface="Trebuchet MS" pitchFamily="34" charset="0"/>
               </a:rPr>
               <a:t>This template was specifically designed for a 48x36 tri-fold presentation.</a:t>
             </a:r>
             <a:r>
-              <a:rPr lang="en-US" sz="3200" baseline="0" dirty="0" smtClean="0">
+              <a:rPr lang="en-US" sz="3200" baseline="0" dirty="0">
                 <a:latin typeface="Trebuchet MS" pitchFamily="34" charset="0"/>
               </a:rPr>
               <a:t> I</a:t>
             </a:r>
             <a:r>
-              <a:rPr lang="en-US" sz="3200" dirty="0" smtClean="0">
+              <a:rPr lang="en-US" sz="3200" dirty="0">
                 <a:latin typeface="Trebuchet MS" pitchFamily="34" charset="0"/>
               </a:rPr>
               <a:t>ts</a:t>
             </a:r>
             <a:r>
-              <a:rPr lang="en-US" sz="3200" baseline="0" dirty="0" smtClean="0">
+              <a:rPr lang="en-US" sz="3200" baseline="0" dirty="0">
                 <a:latin typeface="Trebuchet MS" pitchFamily="34" charset="0"/>
               </a:rPr>
               <a:t> layout should not be changed or it may not fit on a standard board</a:t>
             </a:r>
             <a:r>
-              <a:rPr lang="en-US" sz="3200" dirty="0" smtClean="0">
+              <a:rPr lang="en-US" sz="3200" dirty="0">
                 <a:latin typeface="Trebuchet MS" pitchFamily="34" charset="0"/>
               </a:rPr>
               <a:t>.</a:t>
             </a:r>
             <a:r>
-              <a:rPr lang="en-US" sz="3200" baseline="0" dirty="0" smtClean="0">
+              <a:rPr lang="en-US" sz="3200" baseline="0" dirty="0">
                 <a:latin typeface="Trebuchet MS" pitchFamily="34" charset="0"/>
               </a:rPr>
               <a:t> It has a one foot column on the left, a 2 foot column in the middle and a 1 foot column on the right.</a:t>
             </a:r>
-            <a:endParaRPr lang="en-US" sz="3200" dirty="0" smtClean="0">
+            <a:endParaRPr lang="en-US" sz="3200" dirty="0">
               <a:latin typeface="Trebuchet MS" pitchFamily="34" charset="0"/>
             </a:endParaRPr>
           </a:p>
@@ -3527,7 +3474,7 @@
               <a:defRPr/>
             </a:pPr>
             <a:r>
-              <a:rPr lang="en-US" sz="3200" baseline="0" dirty="0" smtClean="0">
+              <a:rPr lang="en-US" sz="3200" baseline="0" dirty="0">
                 <a:latin typeface="Trebuchet MS" pitchFamily="34" charset="0"/>
               </a:rPr>
               <a:t>The columns in the provided layout are fixed and cannot be moved but advanced users can modify any layout by going to VIEW and then SLIDE MASTER.</a:t>
@@ -3551,14 +3498,14 @@
               <a:tabLst/>
               <a:defRPr/>
             </a:pPr>
-            <a:endParaRPr lang="en-US" sz="3200" baseline="0" dirty="0" smtClean="0">
+            <a:endParaRPr lang="en-US" sz="3200" baseline="0" dirty="0">
               <a:latin typeface="Trebuchet MS" pitchFamily="34" charset="0"/>
             </a:endParaRPr>
           </a:p>
           <a:p>
             <a:pPr defTabSz="3134780"/>
             <a:r>
-              <a:rPr lang="en-US" sz="3200" b="1" baseline="0" dirty="0" smtClean="0">
+              <a:rPr lang="en-US" sz="3200" b="1" baseline="0" dirty="0">
                 <a:solidFill>
                   <a:srgbClr val="FFFF00"/>
                 </a:solidFill>
@@ -3570,13 +3517,13 @@
           <a:p>
             <a:pPr defTabSz="3134780"/>
             <a:r>
-              <a:rPr lang="en-US" sz="3200" b="1" u="sng" baseline="0" dirty="0" smtClean="0">
+              <a:rPr lang="en-US" sz="3200" b="1" u="sng" baseline="0" dirty="0">
                 <a:latin typeface="Trebuchet MS" pitchFamily="34" charset="0"/>
               </a:rPr>
               <a:t>TEXT: </a:t>
             </a:r>
             <a:r>
-              <a:rPr lang="en-US" sz="3200" baseline="0" dirty="0" smtClean="0">
+              <a:rPr lang="en-US" sz="3200" baseline="0" dirty="0">
                 <a:latin typeface="Trebuchet MS" pitchFamily="34" charset="0"/>
               </a:rPr>
               <a:t>Paste or type your text into a pre-existing placeholder or drag in a new placeholder from the left side of the template. Move it anywhere as needed.</a:t>
@@ -3585,25 +3532,25 @@
           <a:p>
             <a:pPr defTabSz="3134780"/>
             <a:r>
-              <a:rPr lang="en-US" sz="3200" b="1" u="sng" baseline="0" dirty="0" smtClean="0">
+              <a:rPr lang="en-US" sz="3200" b="1" u="sng" baseline="0" dirty="0">
                 <a:latin typeface="Trebuchet MS" pitchFamily="34" charset="0"/>
               </a:rPr>
               <a:t>PHOTOS: </a:t>
             </a:r>
             <a:r>
-              <a:rPr lang="en-US" sz="3200" baseline="0" dirty="0" smtClean="0">
+              <a:rPr lang="en-US" sz="3200" baseline="0" dirty="0">
                 <a:latin typeface="Trebuchet MS" pitchFamily="34" charset="0"/>
               </a:rPr>
               <a:t>Drag in a picture placeholder, size it </a:t>
             </a:r>
             <a:r>
-              <a:rPr lang="en-US" sz="3200" u="sng" baseline="0" dirty="0" smtClean="0">
+              <a:rPr lang="en-US" sz="3200" u="sng" baseline="0" dirty="0">
                 <a:latin typeface="Trebuchet MS" pitchFamily="34" charset="0"/>
               </a:rPr>
               <a:t>first</a:t>
             </a:r>
             <a:r>
-              <a:rPr lang="en-US" sz="3200" baseline="0" dirty="0" smtClean="0">
+              <a:rPr lang="en-US" sz="3200" baseline="0" dirty="0">
                 <a:latin typeface="Trebuchet MS" pitchFamily="34" charset="0"/>
               </a:rPr>
               <a:t>, click in it and insert a photo from the menu.</a:t>
@@ -3612,25 +3559,25 @@
           <a:p>
             <a:pPr defTabSz="3134780"/>
             <a:r>
-              <a:rPr lang="en-US" sz="3200" b="1" u="sng" baseline="0" dirty="0" smtClean="0">
+              <a:rPr lang="en-US" sz="3200" b="1" u="sng" baseline="0" dirty="0">
                 <a:latin typeface="Trebuchet MS" pitchFamily="34" charset="0"/>
               </a:rPr>
               <a:t>TABLES: </a:t>
             </a:r>
             <a:r>
-              <a:rPr lang="en-US" sz="3200" baseline="0" dirty="0" smtClean="0">
+              <a:rPr lang="en-US" sz="3200" baseline="0" dirty="0">
                 <a:latin typeface="Trebuchet MS" pitchFamily="34" charset="0"/>
               </a:rPr>
               <a:t>You can copy and paste a table from an external document onto this poster template. To adjust  the way the text fits within the cells of a table that has been pasted, </a:t>
             </a:r>
             <a:r>
-              <a:rPr lang="en-US" sz="3200" u="sng" baseline="0" dirty="0" smtClean="0">
+              <a:rPr lang="en-US" sz="3200" u="sng" baseline="0" dirty="0">
                 <a:latin typeface="Trebuchet MS" pitchFamily="34" charset="0"/>
               </a:rPr>
               <a:t>right-click</a:t>
             </a:r>
             <a:r>
-              <a:rPr lang="en-US" sz="3200" baseline="0" dirty="0" smtClean="0">
+              <a:rPr lang="en-US" sz="3200" baseline="0" dirty="0">
                 <a:latin typeface="Trebuchet MS" pitchFamily="34" charset="0"/>
               </a:rPr>
               <a:t> on the table, click FORMAT SHAPE  then click on TEXT BOX and change the INTERNAL MARGIN values to 0.25</a:t>
@@ -3638,7 +3585,7 @@
           </a:p>
           <a:p>
             <a:pPr defTabSz="3134780"/>
-            <a:endParaRPr lang="en-US" sz="3200" b="1" baseline="0" dirty="0" smtClean="0">
+            <a:endParaRPr lang="en-US" sz="3200" b="1" baseline="0" dirty="0">
               <a:solidFill>
                 <a:srgbClr val="FFFF00"/>
               </a:solidFill>
@@ -3648,7 +3595,7 @@
           <a:p>
             <a:pPr defTabSz="3134780"/>
             <a:r>
-              <a:rPr lang="en-US" sz="3200" b="1" baseline="0" dirty="0" smtClean="0">
+              <a:rPr lang="en-US" sz="3200" b="1" baseline="0" dirty="0">
                 <a:solidFill>
                   <a:srgbClr val="FFFF00"/>
                 </a:solidFill>
@@ -3660,30 +3607,30 @@
           <a:p>
             <a:pPr defTabSz="3134780"/>
             <a:r>
-              <a:rPr lang="en-US" sz="3200" baseline="0" smtClean="0">
+              <a:rPr lang="en-US" sz="3200" baseline="0">
                 <a:latin typeface="Trebuchet MS" pitchFamily="34" charset="0"/>
               </a:rPr>
               <a:t>To change the color scheme of this template go to the “Design” menu and click on “Colors”. You can choose from the provide color combinations or you can create your own.</a:t>
             </a:r>
-            <a:endParaRPr lang="en-US" sz="3200" baseline="0" dirty="0" smtClean="0">
+            <a:endParaRPr lang="en-US" sz="3200" baseline="0" dirty="0">
               <a:latin typeface="Trebuchet MS" pitchFamily="34" charset="0"/>
             </a:endParaRPr>
           </a:p>
           <a:p>
             <a:pPr defTabSz="4389219"/>
-            <a:endParaRPr lang="en-US" sz="2000" baseline="0" dirty="0" smtClean="0">
+            <a:endParaRPr lang="en-US" sz="2000" baseline="0" dirty="0">
               <a:latin typeface="Trebuchet MS" pitchFamily="34" charset="0"/>
             </a:endParaRPr>
           </a:p>
           <a:p>
             <a:pPr defTabSz="4389219"/>
-            <a:endParaRPr lang="en-US" sz="2000" dirty="0" smtClean="0">
+            <a:endParaRPr lang="en-US" sz="2000" dirty="0">
               <a:latin typeface="Trebuchet MS" pitchFamily="34" charset="0"/>
             </a:endParaRPr>
           </a:p>
           <a:p>
             <a:pPr algn="ctr"/>
-            <a:endParaRPr lang="en-US" sz="2000" b="1" dirty="0" smtClean="0">
+            <a:endParaRPr lang="en-US" sz="2000" b="1" dirty="0">
               <a:solidFill>
                 <a:schemeClr val="bg1"/>
               </a:solidFill>
@@ -3692,7 +3639,7 @@
           </a:p>
           <a:p>
             <a:pPr defTabSz="4389219"/>
-            <a:endParaRPr lang="en-US" sz="2000" b="1" dirty="0" smtClean="0">
+            <a:endParaRPr lang="en-US" sz="2000" b="1" dirty="0">
               <a:solidFill>
                 <a:srgbClr val="FFFF00"/>
               </a:solidFill>
@@ -3750,7 +3697,7 @@
           <a:p>
             <a:pPr algn="ctr"/>
             <a:r>
-              <a:rPr lang="en-US" sz="4400" b="1" dirty="0" smtClean="0">
+              <a:rPr lang="en-US" sz="4400" b="1" dirty="0">
                 <a:solidFill>
                   <a:schemeClr val="bg1"/>
                 </a:solidFill>
@@ -3759,7 +3706,7 @@
               <a:t>QUICK DESIGN</a:t>
             </a:r>
             <a:r>
-              <a:rPr lang="en-US" sz="4400" b="1" baseline="0" dirty="0" smtClean="0">
+              <a:rPr lang="en-US" sz="4400" b="1" baseline="0" dirty="0">
                 <a:solidFill>
                   <a:schemeClr val="bg1"/>
                 </a:solidFill>
@@ -3768,7 +3715,7 @@
               <a:t> </a:t>
             </a:r>
             <a:r>
-              <a:rPr lang="en-US" sz="4400" b="1" dirty="0" smtClean="0">
+              <a:rPr lang="en-US" sz="4400" b="1" dirty="0">
                 <a:solidFill>
                   <a:schemeClr val="bg1"/>
                 </a:solidFill>
@@ -3780,7 +3727,7 @@
           <a:p>
             <a:pPr algn="ctr"/>
             <a:r>
-              <a:rPr lang="en-US" sz="4000" b="1" dirty="0" smtClean="0">
+              <a:rPr lang="en-US" sz="4000" b="1" dirty="0">
                 <a:solidFill>
                   <a:srgbClr val="FFFF00"/>
                 </a:solidFill>
@@ -3791,62 +3738,62 @@
           </a:p>
           <a:p>
             <a:pPr algn="ctr"/>
-            <a:endParaRPr lang="en-US" sz="3200" b="1" dirty="0" smtClean="0">
+            <a:endParaRPr lang="en-US" sz="3200" b="1" dirty="0">
               <a:latin typeface="Trebuchet MS" pitchFamily="34" charset="0"/>
             </a:endParaRPr>
           </a:p>
           <a:p>
             <a:pPr defTabSz="4389219"/>
             <a:r>
-              <a:rPr lang="en-US" sz="3200" dirty="0" smtClean="0">
+              <a:rPr lang="en-US" sz="3200" dirty="0">
                 <a:latin typeface="Trebuchet MS" pitchFamily="34" charset="0"/>
               </a:rPr>
               <a:t>This PowerPoint</a:t>
             </a:r>
             <a:r>
-              <a:rPr lang="en-US" sz="3200" baseline="0" dirty="0" smtClean="0">
+              <a:rPr lang="en-US" sz="3200" baseline="0" dirty="0">
                 <a:latin typeface="Trebuchet MS" pitchFamily="34" charset="0"/>
               </a:rPr>
               <a:t> </a:t>
             </a:r>
             <a:r>
-              <a:rPr lang="en-US" sz="3200" dirty="0" smtClean="0">
+              <a:rPr lang="en-US" sz="3200" dirty="0">
                 <a:latin typeface="Trebuchet MS" pitchFamily="34" charset="0"/>
               </a:rPr>
               <a:t>2007 template produces</a:t>
             </a:r>
             <a:r>
-              <a:rPr lang="en-US" sz="3200" baseline="0" dirty="0" smtClean="0">
+              <a:rPr lang="en-US" sz="3200" baseline="0" dirty="0">
                 <a:latin typeface="Trebuchet MS" pitchFamily="34" charset="0"/>
               </a:rPr>
               <a:t> </a:t>
             </a:r>
             <a:r>
-              <a:rPr lang="en-US" sz="3200" dirty="0" smtClean="0">
+              <a:rPr lang="en-US" sz="3200" dirty="0">
                 <a:latin typeface="Trebuchet MS" pitchFamily="34" charset="0"/>
               </a:rPr>
               <a:t>a 36”x48” tri-fold presentation  poster. It</a:t>
             </a:r>
             <a:r>
-              <a:rPr lang="en-US" sz="3200" baseline="0" dirty="0" smtClean="0">
+              <a:rPr lang="en-US" sz="3200" baseline="0" dirty="0">
                 <a:latin typeface="Trebuchet MS" pitchFamily="34" charset="0"/>
               </a:rPr>
               <a:t> </a:t>
             </a:r>
             <a:r>
-              <a:rPr lang="en-US" sz="3200" dirty="0" smtClean="0">
+              <a:rPr lang="en-US" sz="3200" dirty="0">
                 <a:latin typeface="Trebuchet MS" pitchFamily="34" charset="0"/>
               </a:rPr>
               <a:t>will save you valuable time placing titles, subtitles,</a:t>
             </a:r>
             <a:r>
-              <a:rPr lang="en-US" sz="3200" baseline="0" dirty="0" smtClean="0">
+              <a:rPr lang="en-US" sz="3200" baseline="0" dirty="0">
                 <a:latin typeface="Trebuchet MS" pitchFamily="34" charset="0"/>
               </a:rPr>
               <a:t> text, and graphics</a:t>
             </a:r>
             <a:r>
-              <a:rPr lang="en-US" sz="3200" dirty="0" smtClean="0">
+              <a:rPr lang="en-US" sz="3200" dirty="0">
                 <a:latin typeface="Trebuchet MS" pitchFamily="34" charset="0"/>
               </a:rPr>
               <a:t>. </a:t>
@@ -3854,67 +3801,67 @@
           </a:p>
           <a:p>
             <a:pPr defTabSz="4389219"/>
-            <a:endParaRPr lang="en-US" sz="3200" dirty="0" smtClean="0">
+            <a:endParaRPr lang="en-US" sz="3200" dirty="0">
               <a:latin typeface="Trebuchet MS" pitchFamily="34" charset="0"/>
             </a:endParaRPr>
           </a:p>
           <a:p>
             <a:pPr defTabSz="4389219"/>
             <a:r>
-              <a:rPr lang="en-US" sz="3200" dirty="0" smtClean="0">
+              <a:rPr lang="en-US" sz="3200" dirty="0">
                 <a:latin typeface="Trebuchet MS" pitchFamily="34" charset="0"/>
               </a:rPr>
               <a:t>Use it to create your presentation. Then send</a:t>
             </a:r>
             <a:r>
-              <a:rPr lang="en-US" sz="3200" baseline="0" dirty="0" smtClean="0">
+              <a:rPr lang="en-US" sz="3200" baseline="0" dirty="0">
                 <a:latin typeface="Trebuchet MS" pitchFamily="34" charset="0"/>
               </a:rPr>
               <a:t> it </a:t>
             </a:r>
             <a:r>
-              <a:rPr lang="en-US" sz="3200" dirty="0" smtClean="0">
+              <a:rPr lang="en-US" sz="3200" dirty="0">
                 <a:latin typeface="Trebuchet MS" pitchFamily="34" charset="0"/>
               </a:rPr>
               <a:t>to </a:t>
             </a:r>
             <a:r>
-              <a:rPr lang="en-US" sz="3200" b="1" dirty="0" smtClean="0">
+              <a:rPr lang="en-US" sz="3200" b="1" dirty="0">
                 <a:latin typeface="Trebuchet MS" pitchFamily="34" charset="0"/>
               </a:rPr>
               <a:t>PosterPresentations.com</a:t>
             </a:r>
             <a:r>
-              <a:rPr lang="en-US" sz="3200" dirty="0" smtClean="0">
+              <a:rPr lang="en-US" sz="3200" dirty="0">
                 <a:latin typeface="Trebuchet MS" pitchFamily="34" charset="0"/>
               </a:rPr>
               <a:t> for premium quality, same day affordable printing.</a:t>
             </a:r>
             <a:br>
-              <a:rPr lang="en-US" sz="3200" dirty="0" smtClean="0">
+              <a:rPr lang="en-US" sz="3200" dirty="0">
                 <a:latin typeface="Trebuchet MS" pitchFamily="34" charset="0"/>
               </a:rPr>
             </a:br>
-            <a:endParaRPr lang="en-US" sz="3200" dirty="0" smtClean="0">
+            <a:endParaRPr lang="en-US" sz="3200" dirty="0">
               <a:latin typeface="Trebuchet MS" pitchFamily="34" charset="0"/>
             </a:endParaRPr>
           </a:p>
           <a:p>
             <a:pPr defTabSz="4389219"/>
             <a:r>
-              <a:rPr lang="en-US" sz="3200" dirty="0" smtClean="0">
+              <a:rPr lang="en-US" sz="3200" dirty="0">
                 <a:latin typeface="Trebuchet MS" pitchFamily="34" charset="0"/>
               </a:rPr>
               <a:t>We provide a series of </a:t>
             </a:r>
             <a:r>
-              <a:rPr lang="en-US" sz="3200" b="1" dirty="0" smtClean="0">
+              <a:rPr lang="en-US" sz="3200" b="1" dirty="0">
                 <a:latin typeface="Trebuchet MS" pitchFamily="34" charset="0"/>
               </a:rPr>
               <a:t>online tutorials</a:t>
             </a:r>
             <a:r>
-              <a:rPr lang="en-US" sz="3200" dirty="0" smtClean="0">
+              <a:rPr lang="en-US" sz="3200" dirty="0">
                 <a:latin typeface="Trebuchet MS" pitchFamily="34" charset="0"/>
               </a:rPr>
               <a:t> that will guide you through the poster design process and answer your poster production questions. </a:t>
@@ -3922,37 +3869,31 @@
           </a:p>
           <a:p>
             <a:pPr defTabSz="4389219"/>
-            <a:endParaRPr lang="en-US" sz="3200" dirty="0" smtClean="0">
+            <a:endParaRPr lang="en-US" sz="3200" dirty="0">
               <a:latin typeface="Trebuchet MS" pitchFamily="34" charset="0"/>
             </a:endParaRPr>
           </a:p>
           <a:p>
             <a:pPr defTabSz="4389219"/>
             <a:r>
-              <a:rPr lang="en-US" sz="3200" dirty="0" smtClean="0">
+              <a:rPr lang="en-US" sz="3200" dirty="0">
                 <a:latin typeface="Trebuchet MS" pitchFamily="34" charset="0"/>
               </a:rPr>
               <a:t>View our online</a:t>
             </a:r>
             <a:r>
-              <a:rPr lang="en-US" sz="3200" baseline="0" dirty="0" smtClean="0">
+              <a:rPr lang="en-US" sz="3200" baseline="0" dirty="0">
                 <a:latin typeface="Trebuchet MS" pitchFamily="34" charset="0"/>
               </a:rPr>
               <a:t> tutorials at:</a:t>
             </a:r>
-            <a:r>
-              <a:rPr lang="en-US" sz="3200" dirty="0" smtClean="0">
-                <a:latin typeface="Trebuchet MS" pitchFamily="34" charset="0"/>
-              </a:rPr>
-              <a:t/>
-            </a:r>
             <a:br>
-              <a:rPr lang="en-US" sz="3200" dirty="0" smtClean="0">
+              <a:rPr lang="en-US" sz="3200" dirty="0">
                 <a:latin typeface="Trebuchet MS" pitchFamily="34" charset="0"/>
               </a:rPr>
             </a:br>
             <a:r>
-              <a:rPr lang="en-US" sz="3200" dirty="0" smtClean="0">
+              <a:rPr lang="en-US" sz="3200" dirty="0">
                 <a:solidFill>
                   <a:srgbClr val="FFFF00"/>
                 </a:solidFill>
@@ -3960,25 +3901,19 @@
               </a:rPr>
               <a:t> http://bit.ly/Poster_creation_help </a:t>
             </a:r>
-            <a:r>
-              <a:rPr lang="en-US" sz="3200" dirty="0" smtClean="0">
-                <a:latin typeface="Trebuchet MS" pitchFamily="34" charset="0"/>
-              </a:rPr>
-              <a:t/>
-            </a:r>
             <a:br>
-              <a:rPr lang="en-US" sz="3200" dirty="0" smtClean="0">
+              <a:rPr lang="en-US" sz="3200" dirty="0">
                 <a:latin typeface="Trebuchet MS" pitchFamily="34" charset="0"/>
               </a:rPr>
             </a:br>
             <a:r>
-              <a:rPr lang="en-US" sz="3200" dirty="0" smtClean="0">
+              <a:rPr lang="en-US" sz="3200" dirty="0">
                 <a:latin typeface="Trebuchet MS" pitchFamily="34" charset="0"/>
               </a:rPr>
               <a:t>(copy</a:t>
             </a:r>
             <a:r>
-              <a:rPr lang="en-US" sz="3200" baseline="0" dirty="0" smtClean="0">
+              <a:rPr lang="en-US" sz="3200" baseline="0" dirty="0">
                 <a:latin typeface="Trebuchet MS" pitchFamily="34" charset="0"/>
               </a:rPr>
               <a:t> and paste the link into your web browser).</a:t>
@@ -3986,20 +3921,20 @@
           </a:p>
           <a:p>
             <a:pPr defTabSz="4389219"/>
-            <a:endParaRPr lang="en-US" sz="3200" dirty="0" smtClean="0">
+            <a:endParaRPr lang="en-US" sz="3200" dirty="0">
               <a:latin typeface="Trebuchet MS" pitchFamily="34" charset="0"/>
             </a:endParaRPr>
           </a:p>
           <a:p>
             <a:pPr defTabSz="4389219"/>
             <a:r>
-              <a:rPr lang="en-US" sz="3200" dirty="0" smtClean="0">
+              <a:rPr lang="en-US" sz="3200" dirty="0">
                 <a:latin typeface="Trebuchet MS" pitchFamily="34" charset="0"/>
               </a:rPr>
               <a:t>For assistance and to order your printed poster</a:t>
             </a:r>
             <a:r>
-              <a:rPr lang="en-US" sz="3200" dirty="0" smtClean="0">
+              <a:rPr lang="en-US" sz="3200" dirty="0">
                 <a:solidFill>
                   <a:schemeClr val="bg1"/>
                 </a:solidFill>
@@ -4008,7 +3943,7 @@
               <a:t> call </a:t>
             </a:r>
             <a:r>
-              <a:rPr lang="en-US" sz="3200" b="1" dirty="0" smtClean="0">
+              <a:rPr lang="en-US" sz="3200" b="1" dirty="0">
                 <a:solidFill>
                   <a:srgbClr val="FFFF00"/>
                 </a:solidFill>
@@ -4017,7 +3952,7 @@
               <a:t>PosterPresentations.com</a:t>
             </a:r>
             <a:r>
-              <a:rPr lang="en-US" sz="3200" dirty="0" smtClean="0">
+              <a:rPr lang="en-US" sz="3200" dirty="0">
                 <a:solidFill>
                   <a:srgbClr val="FFFF00"/>
                 </a:solidFill>
@@ -4026,13 +3961,13 @@
               <a:t> </a:t>
             </a:r>
             <a:r>
-              <a:rPr lang="en-US" sz="3200" dirty="0" smtClean="0">
+              <a:rPr lang="en-US" sz="3200" dirty="0">
                 <a:latin typeface="Trebuchet MS" pitchFamily="34" charset="0"/>
               </a:rPr>
               <a:t>at </a:t>
             </a:r>
             <a:r>
-              <a:rPr lang="en-US" sz="4000" b="1" dirty="0" smtClean="0">
+              <a:rPr lang="en-US" sz="4000" b="1" dirty="0">
                 <a:solidFill>
                   <a:srgbClr val="FFFF00"/>
                 </a:solidFill>
@@ -4043,7 +3978,7 @@
           </a:p>
           <a:p>
             <a:pPr defTabSz="4389219"/>
-            <a:endParaRPr lang="en-US" sz="4000" b="1" dirty="0" smtClean="0">
+            <a:endParaRPr lang="en-US" sz="4000" b="1" dirty="0">
               <a:solidFill>
                 <a:srgbClr val="FFFF00"/>
               </a:solidFill>
@@ -4052,7 +3987,7 @@
           </a:p>
           <a:p>
             <a:pPr defTabSz="4389219"/>
-            <a:endParaRPr lang="en-US" sz="4000" b="1" dirty="0" smtClean="0">
+            <a:endParaRPr lang="en-US" sz="4000" b="1" dirty="0">
               <a:solidFill>
                 <a:srgbClr val="FFFF00"/>
               </a:solidFill>
@@ -4062,7 +3997,7 @@
           <a:p>
             <a:pPr algn="ctr"/>
             <a:r>
-              <a:rPr lang="en-US" sz="4400" b="1" dirty="0" smtClean="0">
+              <a:rPr lang="en-US" sz="4400" b="1" dirty="0">
                 <a:solidFill>
                   <a:schemeClr val="bg1"/>
                 </a:solidFill>
@@ -4073,7 +4008,7 @@
           </a:p>
           <a:p>
             <a:pPr algn="ctr"/>
-            <a:endParaRPr lang="en-US" sz="4400" b="1" dirty="0" smtClean="0">
+            <a:endParaRPr lang="en-US" sz="4400" b="1" dirty="0">
               <a:solidFill>
                 <a:schemeClr val="bg1"/>
               </a:solidFill>
@@ -4083,31 +4018,31 @@
           <a:p>
             <a:pPr defTabSz="4389219"/>
             <a:r>
-              <a:rPr lang="en-US" sz="3200" dirty="0" smtClean="0">
+              <a:rPr lang="en-US" sz="3200" dirty="0">
                 <a:latin typeface="Trebuchet MS" pitchFamily="34" charset="0"/>
               </a:rPr>
               <a:t>Use the placeholders provided below to add new elements to your poster:</a:t>
             </a:r>
             <a:r>
-              <a:rPr lang="en-US" sz="3200" baseline="0" dirty="0" smtClean="0">
+              <a:rPr lang="en-US" sz="3200" baseline="0" dirty="0">
                 <a:latin typeface="Trebuchet MS" pitchFamily="34" charset="0"/>
               </a:rPr>
               <a:t> </a:t>
             </a:r>
             <a:r>
-              <a:rPr lang="en-US" sz="3200" dirty="0" smtClean="0">
+              <a:rPr lang="en-US" sz="3200" dirty="0">
                 <a:latin typeface="Trebuchet MS" pitchFamily="34" charset="0"/>
               </a:rPr>
               <a:t>Drag a placeholder onto the</a:t>
             </a:r>
             <a:r>
-              <a:rPr lang="en-US" sz="3200" baseline="0" dirty="0" smtClean="0">
+              <a:rPr lang="en-US" sz="3200" baseline="0" dirty="0">
                 <a:latin typeface="Trebuchet MS" pitchFamily="34" charset="0"/>
               </a:rPr>
               <a:t> poster area,</a:t>
             </a:r>
             <a:r>
-              <a:rPr lang="en-US" sz="3200" dirty="0" smtClean="0">
+              <a:rPr lang="en-US" sz="3200" dirty="0">
                 <a:latin typeface="Trebuchet MS" pitchFamily="34" charset="0"/>
               </a:rPr>
               <a:t> size it, and click it to edit.</a:t>
@@ -4115,14 +4050,14 @@
           </a:p>
           <a:p>
             <a:pPr defTabSz="4389219"/>
-            <a:endParaRPr lang="en-US" sz="3200" dirty="0" smtClean="0">
+            <a:endParaRPr lang="en-US" sz="3200" dirty="0">
               <a:latin typeface="Trebuchet MS" pitchFamily="34" charset="0"/>
             </a:endParaRPr>
           </a:p>
           <a:p>
             <a:pPr defTabSz="4389219"/>
             <a:r>
-              <a:rPr lang="en-US" sz="3200" b="1" dirty="0" smtClean="0">
+              <a:rPr lang="en-US" sz="3200" b="1" dirty="0">
                 <a:solidFill>
                   <a:srgbClr val="FFFF00"/>
                 </a:solidFill>
@@ -4134,13 +4069,13 @@
           <a:p>
             <a:pPr defTabSz="4389219"/>
             <a:r>
-              <a:rPr lang="en-US" sz="3200" dirty="0" smtClean="0">
+              <a:rPr lang="en-US" sz="3200" dirty="0">
                 <a:latin typeface="Trebuchet MS" pitchFamily="34" charset="0"/>
               </a:rPr>
               <a:t>Move</a:t>
             </a:r>
             <a:r>
-              <a:rPr lang="en-US" sz="3200" baseline="0" dirty="0" smtClean="0">
+              <a:rPr lang="en-US" sz="3200" baseline="0" dirty="0">
                 <a:latin typeface="Trebuchet MS" pitchFamily="34" charset="0"/>
               </a:rPr>
               <a:t> this preformatted section header placeholder to the poster area to add another section header. Use section headers to separate topics or concepts within your presentation. </a:t>
@@ -4148,19 +4083,19 @@
           </a:p>
           <a:p>
             <a:pPr defTabSz="4389219"/>
-            <a:endParaRPr lang="en-US" sz="3200" baseline="0" dirty="0" smtClean="0">
+            <a:endParaRPr lang="en-US" sz="3200" baseline="0" dirty="0">
               <a:latin typeface="Trebuchet MS" pitchFamily="34" charset="0"/>
             </a:endParaRPr>
           </a:p>
           <a:p>
             <a:pPr defTabSz="4389219"/>
-            <a:endParaRPr lang="en-US" sz="3200" dirty="0" smtClean="0">
+            <a:endParaRPr lang="en-US" sz="3200" dirty="0">
               <a:latin typeface="Trebuchet MS" pitchFamily="34" charset="0"/>
             </a:endParaRPr>
           </a:p>
           <a:p>
             <a:pPr defTabSz="4389219"/>
-            <a:endParaRPr lang="en-US" sz="3200" b="1" dirty="0" smtClean="0">
+            <a:endParaRPr lang="en-US" sz="3200" b="1" dirty="0">
               <a:solidFill>
                 <a:srgbClr val="FFFF00"/>
               </a:solidFill>
@@ -4170,7 +4105,7 @@
           <a:p>
             <a:pPr defTabSz="4389219"/>
             <a:r>
-              <a:rPr lang="en-US" sz="3200" b="1" dirty="0" smtClean="0">
+              <a:rPr lang="en-US" sz="3200" b="1" dirty="0">
                 <a:solidFill>
                   <a:srgbClr val="FFFF00"/>
                 </a:solidFill>
@@ -4182,7 +4117,7 @@
           <a:p>
             <a:pPr defTabSz="4389219"/>
             <a:r>
-              <a:rPr lang="en-US" sz="3200" baseline="0" dirty="0" smtClean="0">
+              <a:rPr lang="en-US" sz="3200" baseline="0" dirty="0">
                 <a:latin typeface="Trebuchet MS" pitchFamily="34" charset="0"/>
               </a:rPr>
               <a:t>Move this preformatted text placeholder to the poster to add a new body of text.</a:t>
@@ -4190,25 +4125,25 @@
           </a:p>
           <a:p>
             <a:pPr defTabSz="4389219"/>
-            <a:endParaRPr lang="en-US" sz="3200" baseline="0" dirty="0" smtClean="0">
+            <a:endParaRPr lang="en-US" sz="3200" baseline="0" dirty="0">
               <a:latin typeface="Trebuchet MS" pitchFamily="34" charset="0"/>
             </a:endParaRPr>
           </a:p>
           <a:p>
             <a:pPr defTabSz="4389219"/>
-            <a:endParaRPr lang="en-US" sz="3200" baseline="0" dirty="0" smtClean="0">
+            <a:endParaRPr lang="en-US" sz="3200" baseline="0" dirty="0">
               <a:latin typeface="Trebuchet MS" pitchFamily="34" charset="0"/>
             </a:endParaRPr>
           </a:p>
           <a:p>
             <a:pPr defTabSz="4389219"/>
-            <a:endParaRPr lang="en-US" sz="3200" baseline="0" dirty="0" smtClean="0">
+            <a:endParaRPr lang="en-US" sz="3200" baseline="0" dirty="0">
               <a:latin typeface="Trebuchet MS" pitchFamily="34" charset="0"/>
             </a:endParaRPr>
           </a:p>
           <a:p>
             <a:pPr defTabSz="4389219"/>
-            <a:endParaRPr lang="en-US" sz="3200" b="1" baseline="0" dirty="0" smtClean="0">
+            <a:endParaRPr lang="en-US" sz="3200" b="1" baseline="0" dirty="0">
               <a:solidFill>
                 <a:srgbClr val="FFFF00"/>
               </a:solidFill>
@@ -4218,7 +4153,7 @@
           <a:p>
             <a:pPr defTabSz="4389219"/>
             <a:r>
-              <a:rPr lang="en-US" sz="3200" b="1" baseline="0" dirty="0" smtClean="0">
+              <a:rPr lang="en-US" sz="3200" b="1" baseline="0" dirty="0">
                 <a:solidFill>
                   <a:srgbClr val="FFFF00"/>
                 </a:solidFill>
@@ -4230,7 +4165,7 @@
           <a:p>
             <a:pPr defTabSz="4389219"/>
             <a:r>
-              <a:rPr lang="en-US" sz="3200" baseline="0" dirty="0" smtClean="0">
+              <a:rPr lang="en-US" sz="3200" baseline="0" dirty="0">
                 <a:latin typeface="Trebuchet MS" pitchFamily="34" charset="0"/>
               </a:rPr>
               <a:t>Move this graphic placeholder onto your poster, size it first, and then click it to add a picture to the poster.</a:t>
@@ -4238,73 +4173,73 @@
           </a:p>
           <a:p>
             <a:pPr defTabSz="4389219"/>
-            <a:endParaRPr lang="en-US" sz="3200" baseline="0" dirty="0" smtClean="0">
+            <a:endParaRPr lang="en-US" sz="3200" baseline="0" dirty="0">
               <a:latin typeface="Trebuchet MS" pitchFamily="34" charset="0"/>
             </a:endParaRPr>
           </a:p>
           <a:p>
             <a:pPr defTabSz="4389219"/>
-            <a:endParaRPr lang="en-US" sz="3200" baseline="0" dirty="0" smtClean="0">
+            <a:endParaRPr lang="en-US" sz="3200" baseline="0" dirty="0">
               <a:latin typeface="Trebuchet MS" pitchFamily="34" charset="0"/>
             </a:endParaRPr>
           </a:p>
           <a:p>
             <a:pPr defTabSz="4389219"/>
-            <a:endParaRPr lang="en-US" sz="3200" baseline="0" dirty="0" smtClean="0">
+            <a:endParaRPr lang="en-US" sz="3200" baseline="0" dirty="0">
               <a:latin typeface="Trebuchet MS" pitchFamily="34" charset="0"/>
             </a:endParaRPr>
           </a:p>
           <a:p>
             <a:pPr defTabSz="4389219"/>
-            <a:endParaRPr lang="en-US" sz="3200" baseline="0" dirty="0" smtClean="0">
+            <a:endParaRPr lang="en-US" sz="3200" baseline="0" dirty="0">
               <a:latin typeface="Trebuchet MS" pitchFamily="34" charset="0"/>
             </a:endParaRPr>
           </a:p>
           <a:p>
             <a:pPr defTabSz="4389219"/>
-            <a:endParaRPr lang="en-US" sz="3200" baseline="0" dirty="0" smtClean="0">
+            <a:endParaRPr lang="en-US" sz="3200" baseline="0" dirty="0">
               <a:latin typeface="Trebuchet MS" pitchFamily="34" charset="0"/>
             </a:endParaRPr>
           </a:p>
           <a:p>
             <a:pPr defTabSz="4389219"/>
-            <a:endParaRPr lang="en-US" sz="3200" baseline="0" dirty="0" smtClean="0">
+            <a:endParaRPr lang="en-US" sz="3200" baseline="0" dirty="0">
               <a:latin typeface="Trebuchet MS" pitchFamily="34" charset="0"/>
             </a:endParaRPr>
           </a:p>
           <a:p>
             <a:pPr defTabSz="4389219"/>
-            <a:endParaRPr lang="en-US" sz="3200" baseline="0" dirty="0" smtClean="0">
+            <a:endParaRPr lang="en-US" sz="3200" baseline="0" dirty="0">
               <a:latin typeface="Trebuchet MS" pitchFamily="34" charset="0"/>
             </a:endParaRPr>
           </a:p>
           <a:p>
             <a:pPr defTabSz="4389219"/>
-            <a:endParaRPr lang="en-US" sz="3200" baseline="0" dirty="0" smtClean="0">
+            <a:endParaRPr lang="en-US" sz="3200" baseline="0" dirty="0">
               <a:latin typeface="Trebuchet MS" pitchFamily="34" charset="0"/>
             </a:endParaRPr>
           </a:p>
           <a:p>
             <a:pPr defTabSz="4389219"/>
-            <a:endParaRPr lang="en-US" sz="3200" baseline="0" dirty="0" smtClean="0">
+            <a:endParaRPr lang="en-US" sz="3200" baseline="0" dirty="0">
               <a:latin typeface="Trebuchet MS" pitchFamily="34" charset="0"/>
             </a:endParaRPr>
           </a:p>
           <a:p>
             <a:pPr defTabSz="4389219"/>
-            <a:endParaRPr lang="en-US" sz="3200" baseline="0" dirty="0" smtClean="0">
+            <a:endParaRPr lang="en-US" sz="3200" baseline="0" dirty="0">
               <a:latin typeface="Trebuchet MS" pitchFamily="34" charset="0"/>
             </a:endParaRPr>
           </a:p>
           <a:p>
             <a:pPr defTabSz="4389219"/>
-            <a:endParaRPr lang="en-US" sz="3200" baseline="0" dirty="0" smtClean="0">
+            <a:endParaRPr lang="en-US" sz="3200" baseline="0" dirty="0">
               <a:latin typeface="Trebuchet MS" pitchFamily="34" charset="0"/>
             </a:endParaRPr>
           </a:p>
           <a:p>
             <a:pPr algn="ctr"/>
-            <a:endParaRPr lang="en-US" sz="4400" b="1" dirty="0" smtClean="0">
+            <a:endParaRPr lang="en-US" sz="4400" b="1" dirty="0">
               <a:solidFill>
                 <a:schemeClr val="bg1"/>
               </a:solidFill>
@@ -4313,7 +4248,7 @@
           </a:p>
           <a:p>
             <a:pPr algn="ctr"/>
-            <a:endParaRPr lang="en-US" sz="4400" b="1" dirty="0" smtClean="0">
+            <a:endParaRPr lang="en-US" sz="4400" b="1" dirty="0">
               <a:solidFill>
                 <a:schemeClr val="bg1"/>
               </a:solidFill>
@@ -4322,7 +4257,7 @@
           </a:p>
           <a:p>
             <a:pPr algn="ctr"/>
-            <a:endParaRPr lang="en-US" sz="4400" b="1" dirty="0" smtClean="0">
+            <a:endParaRPr lang="en-US" sz="4400" b="1" dirty="0">
               <a:solidFill>
                 <a:schemeClr val="bg1"/>
               </a:solidFill>
@@ -4331,7 +4266,7 @@
           </a:p>
           <a:p>
             <a:pPr algn="ctr"/>
-            <a:endParaRPr lang="en-US" sz="4400" b="1" dirty="0" smtClean="0">
+            <a:endParaRPr lang="en-US" sz="4400" b="1" dirty="0">
               <a:solidFill>
                 <a:schemeClr val="bg1"/>
               </a:solidFill>
@@ -4340,13 +4275,13 @@
           </a:p>
           <a:p>
             <a:pPr defTabSz="4389219"/>
-            <a:endParaRPr lang="en-US" sz="3200" dirty="0" smtClean="0">
+            <a:endParaRPr lang="en-US" sz="3200" dirty="0">
               <a:latin typeface="Trebuchet MS" pitchFamily="34" charset="0"/>
             </a:endParaRPr>
           </a:p>
           <a:p>
             <a:pPr algn="ctr"/>
-            <a:endParaRPr lang="en-US" sz="3200" b="1" dirty="0" smtClean="0">
+            <a:endParaRPr lang="en-US" sz="3200" b="1" dirty="0">
               <a:solidFill>
                 <a:schemeClr val="bg1"/>
               </a:solidFill>
@@ -4355,7 +4290,7 @@
           </a:p>
           <a:p>
             <a:pPr defTabSz="4389219"/>
-            <a:endParaRPr lang="en-US" sz="3200" b="1" dirty="0" smtClean="0">
+            <a:endParaRPr lang="en-US" sz="3200" b="1" dirty="0">
               <a:solidFill>
                 <a:srgbClr val="FFFF00"/>
               </a:solidFill>
@@ -4493,17 +4428,6 @@
               <a:defRPr/>
             </a:pPr>
             <a:r>
-              <a:rPr lang="en-US" sz="500" b="1" dirty="0" smtClean="0">
-                <a:solidFill>
-                  <a:schemeClr val="bg1">
-                    <a:lumMod val="75000"/>
-                  </a:schemeClr>
-                </a:solidFill>
-                <a:latin typeface="Arial" charset="0"/>
-              </a:rPr>
-              <a:t>RESEARCH POSTER PRESENTATION </a:t>
-            </a:r>
-            <a:r>
               <a:rPr lang="en-US" sz="500" b="1" dirty="0">
                 <a:solidFill>
                   <a:schemeClr val="bg1">
@@ -4512,27 +4436,8 @@
                 </a:solidFill>
                 <a:latin typeface="Arial" charset="0"/>
               </a:rPr>
-              <a:t>DESIGN © </a:t>
-            </a:r>
-            <a:r>
-              <a:rPr lang="en-US" sz="500" b="1" dirty="0" smtClean="0">
-                <a:solidFill>
-                  <a:schemeClr val="bg1">
-                    <a:lumMod val="75000"/>
-                  </a:schemeClr>
-                </a:solidFill>
-                <a:latin typeface="Arial" charset="0"/>
-              </a:rPr>
-              <a:t>2011</a:t>
-            </a:r>
-            <a:endParaRPr lang="en-US" sz="500" b="1" dirty="0">
-              <a:solidFill>
-                <a:schemeClr val="bg1">
-                  <a:lumMod val="75000"/>
-                </a:schemeClr>
-              </a:solidFill>
-              <a:latin typeface="Arial" charset="0"/>
-            </a:endParaRPr>
+              <a:t>RESEARCH POSTER PRESENTATION DESIGN © 2011</a:t>
+            </a:r>
           </a:p>
           <a:p>
             <a:pPr eaLnBrk="0" hangingPunct="0">
@@ -4902,7 +4807,7 @@
           <a:lstStyle/>
           <a:p>
             <a:r>
-              <a:rPr lang="en-US" sz="4400" dirty="0" smtClean="0">
+              <a:rPr lang="en-US" sz="4400" dirty="0">
                 <a:solidFill>
                   <a:schemeClr val="bg1"/>
                 </a:solidFill>
@@ -4910,14 +4815,14 @@
               <a:t>© 2011 PosterPresentations.com</a:t>
             </a:r>
             <a:br>
-              <a:rPr lang="en-US" sz="4400" dirty="0" smtClean="0">
+              <a:rPr lang="en-US" sz="4400" dirty="0">
                 <a:solidFill>
                   <a:schemeClr val="bg1"/>
                 </a:solidFill>
               </a:rPr>
             </a:br>
             <a:r>
-              <a:rPr lang="en-US" sz="4400" dirty="0" smtClean="0">
+              <a:rPr lang="en-US" sz="4400" dirty="0">
                 <a:solidFill>
                   <a:schemeClr val="bg1"/>
                 </a:solidFill>
@@ -4925,7 +4830,7 @@
               <a:t>    </a:t>
             </a:r>
             <a:r>
-              <a:rPr lang="en-US" sz="3700" dirty="0" smtClean="0">
+              <a:rPr lang="en-US" sz="3700" dirty="0">
                 <a:solidFill>
                   <a:schemeClr val="bg1"/>
                 </a:solidFill>
@@ -4933,7 +4838,7 @@
               <a:t>2117 Fourth Street ,</a:t>
             </a:r>
             <a:r>
-              <a:rPr lang="en-US" sz="3700" baseline="0" dirty="0" smtClean="0">
+              <a:rPr lang="en-US" sz="3700" baseline="0" dirty="0">
                 <a:solidFill>
                   <a:schemeClr val="bg1"/>
                 </a:solidFill>
@@ -4941,14 +4846,14 @@
               <a:t> Unit C</a:t>
             </a:r>
             <a:br>
-              <a:rPr lang="en-US" sz="3700" baseline="0" dirty="0" smtClean="0">
+              <a:rPr lang="en-US" sz="3700" baseline="0" dirty="0">
                 <a:solidFill>
                   <a:schemeClr val="bg1"/>
                 </a:solidFill>
               </a:rPr>
             </a:br>
             <a:r>
-              <a:rPr lang="en-US" sz="3700" baseline="0" dirty="0" smtClean="0">
+              <a:rPr lang="en-US" sz="3700" baseline="0" dirty="0">
                 <a:solidFill>
                   <a:schemeClr val="bg1"/>
                 </a:solidFill>
@@ -4956,14 +4861,14 @@
               <a:t>    Berkeley CA 94710</a:t>
             </a:r>
             <a:br>
-              <a:rPr lang="en-US" sz="3700" baseline="0" dirty="0" smtClean="0">
+              <a:rPr lang="en-US" sz="3700" baseline="0" dirty="0">
                 <a:solidFill>
                   <a:schemeClr val="bg1"/>
                 </a:solidFill>
               </a:rPr>
             </a:br>
             <a:r>
-              <a:rPr lang="en-US" sz="3700" baseline="0" dirty="0" smtClean="0">
+              <a:rPr lang="en-US" sz="3700" baseline="0" dirty="0">
                 <a:solidFill>
                   <a:schemeClr val="bg1"/>
                 </a:solidFill>
@@ -4971,7 +4876,7 @@
               <a:t>    </a:t>
             </a:r>
             <a:r>
-              <a:rPr lang="en-US" sz="3700" b="1" baseline="0" dirty="0" smtClean="0">
+              <a:rPr lang="en-US" sz="3700" b="1" baseline="0" dirty="0">
                 <a:solidFill>
                   <a:srgbClr val="FFFF00"/>
                 </a:solidFill>
@@ -5097,7 +5002,7 @@
             <a:lstStyle/>
             <a:p>
               <a:r>
-                <a:rPr lang="en-US" sz="2600" dirty="0" smtClean="0">
+                <a:rPr lang="en-US" sz="2600" dirty="0">
                   <a:solidFill>
                     <a:schemeClr val="tx2"/>
                   </a:solidFill>
@@ -5106,7 +5011,7 @@
                 <a:t>Student</a:t>
               </a:r>
               <a:r>
-                <a:rPr lang="en-US" sz="2600" baseline="0" dirty="0" smtClean="0">
+                <a:rPr lang="en-US" sz="2600" baseline="0" dirty="0">
                   <a:solidFill>
                     <a:schemeClr val="tx2"/>
                   </a:solidFill>
@@ -5115,7 +5020,7 @@
                 <a:t> discounts are available on our </a:t>
               </a:r>
               <a:r>
-                <a:rPr lang="en-US" sz="2600" baseline="0" dirty="0" err="1" smtClean="0">
+                <a:rPr lang="en-US" sz="2600" baseline="0" dirty="0" err="1">
                   <a:solidFill>
                     <a:schemeClr val="tx2"/>
                   </a:solidFill>
@@ -5124,7 +5029,7 @@
                 <a:t>Facebook</a:t>
               </a:r>
               <a:r>
-                <a:rPr lang="en-US" sz="2600" baseline="0" dirty="0" smtClean="0">
+                <a:rPr lang="en-US" sz="2600" baseline="0" dirty="0">
                   <a:solidFill>
                     <a:schemeClr val="tx2"/>
                   </a:solidFill>
@@ -5133,7 +5038,7 @@
                 <a:t> page.</a:t>
               </a:r>
               <a:br>
-                <a:rPr lang="en-US" sz="2600" baseline="0" dirty="0" smtClean="0">
+                <a:rPr lang="en-US" sz="2600" baseline="0" dirty="0">
                   <a:solidFill>
                     <a:schemeClr val="tx2"/>
                   </a:solidFill>
@@ -5141,7 +5046,7 @@
                 </a:rPr>
               </a:br>
               <a:r>
-                <a:rPr lang="en-US" sz="2600" baseline="0" dirty="0" smtClean="0">
+                <a:rPr lang="en-US" sz="2600" baseline="0" dirty="0">
                   <a:solidFill>
                     <a:schemeClr val="tx2"/>
                   </a:solidFill>
@@ -5150,7 +5055,7 @@
                 <a:t>Go to </a:t>
               </a:r>
               <a:r>
-                <a:rPr lang="en-US" sz="2600" u="sng" baseline="0" dirty="0" smtClean="0">
+                <a:rPr lang="en-US" sz="2600" u="sng" baseline="0" dirty="0">
                   <a:solidFill>
                     <a:schemeClr val="tx2"/>
                   </a:solidFill>
@@ -5159,7 +5064,7 @@
                 <a:t>PosterPresentations.com</a:t>
               </a:r>
               <a:r>
-                <a:rPr lang="en-US" sz="2600" baseline="0" dirty="0" smtClean="0">
+                <a:rPr lang="en-US" sz="2600" baseline="0" dirty="0">
                   <a:solidFill>
                     <a:schemeClr val="tx2"/>
                   </a:solidFill>
@@ -5168,7 +5073,7 @@
                 <a:t> and click on the FB icon. </a:t>
               </a:r>
               <a:br>
-                <a:rPr lang="en-US" sz="2600" baseline="0" dirty="0" smtClean="0">
+                <a:rPr lang="en-US" sz="2600" baseline="0" dirty="0">
                   <a:solidFill>
                     <a:schemeClr val="tx2"/>
                   </a:solidFill>
@@ -5361,13 +5266,6 @@
   <p:sldLayoutIdLst>
     <p:sldLayoutId id="2147483652" r:id="rId1"/>
   </p:sldLayoutIdLst>
-  <p:timing>
-    <p:tnLst>
-      <p:par>
-        <p:cTn id="1" dur="indefinite" restart="never" nodeType="tmRoot"/>
-      </p:par>
-    </p:tnLst>
-  </p:timing>
   <p:txStyles>
     <p:titleStyle>
       <a:lvl1pPr algn="ctr" defTabSz="4388900" rtl="0" eaLnBrk="1" latinLnBrk="0" hangingPunct="1">
@@ -5652,7 +5550,7 @@
           <a:blip r:embed="rId3" cstate="print">
             <a:extLst>
               <a:ext uri="{28A0092B-C50C-407E-A947-70E740481C1C}">
-                <a14:useLocalDpi xmlns:a14="http://schemas.microsoft.com/office/drawing/2010/main" xmlns="" val="0"/>
+                <a14:useLocalDpi xmlns:a14="http://schemas.microsoft.com/office/drawing/2010/main" val="0"/>
               </a:ext>
             </a:extLst>
           </a:blip>
@@ -5694,92 +5592,63 @@
           <a:lstStyle/>
           <a:p>
             <a:r>
-              <a:rPr lang="en-US" dirty="0" smtClean="0"/>
+              <a:rPr lang="en-US" dirty="0"/>
               <a:t>[1] MSDN, C# Programmer’s Reference, </a:t>
             </a:r>
           </a:p>
           <a:p>
             <a:r>
-              <a:rPr lang="en-US" u="sng" dirty="0" smtClean="0">
+              <a:rPr lang="en-US" u="sng" dirty="0">
                 <a:hlinkClick r:id="rId4"/>
               </a:rPr>
-              <a:t>https://msdn.microsoft.com/en-us/library/618ayhy6(v=vs.71).</a:t>
-            </a:r>
-            <a:r>
-              <a:rPr lang="en-US" u="sng" dirty="0" smtClean="0">
-                <a:hlinkClick r:id="rId4"/>
-              </a:rPr>
-              <a:t>aspx</a:t>
-            </a:r>
-            <a:endParaRPr lang="en-US" u="sng" dirty="0" smtClean="0"/>
-          </a:p>
-          <a:p>
-            <a:r>
-              <a:rPr lang="en-US" dirty="0" smtClean="0"/>
+              <a:t>https://msdn.microsoft.com/en-us/library/618ayhy6(v=vs.71).aspx</a:t>
+            </a:r>
+            <a:endParaRPr lang="en-US" u="sng" dirty="0"/>
+          </a:p>
+          <a:p>
+            <a:r>
+              <a:rPr lang="en-US" dirty="0"/>
               <a:t>[2] Unity, Unity Scripting Reference, </a:t>
             </a:r>
           </a:p>
           <a:p>
             <a:r>
-              <a:rPr lang="en-US" u="sng" dirty="0" smtClean="0">
+              <a:rPr lang="en-US" u="sng" dirty="0">
                 <a:hlinkClick r:id="rId5"/>
               </a:rPr>
-              <a:t>https://docs.unity3d.com/ScriptReference</a:t>
-            </a:r>
-            <a:r>
-              <a:rPr lang="en-US" u="sng" dirty="0" smtClean="0">
-                <a:hlinkClick r:id="rId5"/>
-              </a:rPr>
-              <a:t>/</a:t>
-            </a:r>
-            <a:endParaRPr lang="en-US" dirty="0" smtClean="0"/>
-          </a:p>
-          <a:p>
-            <a:r>
-              <a:rPr lang="en-US" dirty="0" smtClean="0"/>
-              <a:t>[3] </a:t>
-            </a:r>
-            <a:r>
-              <a:rPr lang="en-US" dirty="0" smtClean="0"/>
-              <a:t>Unity, Unity Test Tools, </a:t>
-            </a:r>
-          </a:p>
-          <a:p>
-            <a:r>
-              <a:rPr lang="en-US" u="sng" dirty="0" smtClean="0">
+              <a:t>https://docs.unity3d.com/ScriptReference/</a:t>
+            </a:r>
+            <a:endParaRPr lang="en-US" dirty="0"/>
+          </a:p>
+          <a:p>
+            <a:r>
+              <a:rPr lang="en-US" dirty="0"/>
+              <a:t>[3] Unity, Unity Test Tools, </a:t>
+            </a:r>
+          </a:p>
+          <a:p>
+            <a:r>
+              <a:rPr lang="en-US" u="sng" dirty="0">
                 <a:hlinkClick r:id="rId6"/>
               </a:rPr>
               <a:t>https://unity3d.com/learn/tutorials/topics/production/unity-test-tools</a:t>
             </a:r>
-            <a:endParaRPr lang="en-US" dirty="0" smtClean="0"/>
-          </a:p>
-          <a:p>
-            <a:r>
-              <a:rPr lang="en-US" dirty="0" smtClean="0"/>
-              <a:t> </a:t>
-            </a:r>
-            <a:r>
-              <a:rPr lang="en-US" dirty="0" smtClean="0"/>
-              <a:t>[4] </a:t>
-            </a:r>
-            <a:r>
-              <a:rPr lang="en-US" dirty="0" smtClean="0"/>
-              <a:t>Google, Google VR SDK for Unity</a:t>
-            </a:r>
-            <a:r>
-              <a:rPr lang="en-US" dirty="0" smtClean="0"/>
-              <a:t>,</a:t>
-            </a:r>
-            <a:endParaRPr lang="en-US" dirty="0" smtClean="0"/>
-          </a:p>
-          <a:p>
-            <a:r>
-              <a:rPr lang="en-US" u="sng" dirty="0" smtClean="0">
+            <a:endParaRPr lang="en-US" dirty="0"/>
+          </a:p>
+          <a:p>
+            <a:r>
+              <a:rPr lang="en-US" dirty="0"/>
+              <a:t> [4] Google, Google VR SDK for Unity,</a:t>
+            </a:r>
+          </a:p>
+          <a:p>
+            <a:r>
+              <a:rPr lang="en-US" u="sng" dirty="0">
                 <a:hlinkClick r:id="rId7"/>
               </a:rPr>
               <a:t>https://developers.google.com/vr/unity/</a:t>
             </a:r>
-            <a:endParaRPr lang="en-US" dirty="0" smtClean="0"/>
+            <a:endParaRPr lang="en-US" dirty="0"/>
           </a:p>
           <a:p>
             <a:endParaRPr lang="en-US" dirty="0"/>
@@ -5808,150 +5677,92 @@
           <a:p>
             <a:pPr algn="just"/>
             <a:r>
-              <a:rPr lang="en-US" sz="3200" dirty="0" smtClean="0">
+              <a:rPr lang="en-US" sz="3200" dirty="0">
                 <a:latin typeface="Arial" panose="020B0604020202020204" pitchFamily="34" charset="0"/>
                 <a:cs typeface="Arial" panose="020B0604020202020204" pitchFamily="34" charset="0"/>
               </a:rPr>
-              <a:t>With the rise of technology, distracted driving has become more of a risk than ever before. As Erie Insurance invests in protecting people, they are taking the initiative in informing families about the dangers of driving while distracted</a:t>
-            </a:r>
-            <a:r>
-              <a:rPr lang="en-US" sz="3200" dirty="0" smtClean="0">
+              <a:t>With the rise of technology, distracted driving has become more of a risk than ever before. As Erie Insurance invests in protecting people, they are taking the initiative in informing families about the dangers of driving while distracted. In order to make these talks with families memorable for the customers, Erie is interested in presenting these dangers in a fun, unforgettable fashion using a relatively new technology, virtual reality.</a:t>
+            </a:r>
+          </a:p>
+          <a:p>
+            <a:pPr algn="just"/>
+            <a:r>
+              <a:rPr lang="en-US" sz="3200" dirty="0">
                 <a:latin typeface="Arial" panose="020B0604020202020204" pitchFamily="34" charset="0"/>
                 <a:cs typeface="Arial" panose="020B0604020202020204" pitchFamily="34" charset="0"/>
               </a:rPr>
-              <a:t>. In order to make these talks with families memorable for the customers, Erie is interested in presenting these dangers in a fun, unforgettable fashion using a relatively new technology, virtual reality.</a:t>
-            </a:r>
-            <a:endParaRPr lang="en-US" sz="3200" dirty="0" smtClean="0">
-              <a:latin typeface="Arial" panose="020B0604020202020204" pitchFamily="34" charset="0"/>
-              <a:cs typeface="Arial" panose="020B0604020202020204" pitchFamily="34" charset="0"/>
-            </a:endParaRPr>
+              <a:t>In the present day, virtual reality technology may seem expensive, and an unattractive paradigm for widespread, distributed use within a company as large as Erie Insurance. The Google Cardboard is the perfect solution. Cardboards are a cheap alternative to the expensive headsets that occupy the rest of the market, costing only $15 for one headset.</a:t>
+            </a:r>
           </a:p>
           <a:p>
             <a:pPr algn="just"/>
             <a:r>
-              <a:rPr lang="en-US" sz="3200" dirty="0" smtClean="0">
+              <a:rPr lang="en-US" sz="3200" dirty="0">
+                <a:latin typeface="Arial" panose="020B0604020202020204" pitchFamily="34" charset="0"/>
+                <a:cs typeface="Arial" panose="020B0604020202020204" pitchFamily="34" charset="0"/>
+              </a:rPr>
+              <a:t>To accomplish this goal, our application puts the user in the passenger seat of a vehicle, being controlled by a driver engaging in distracted driving. Using a reticule located in the middle of the screen, the player must obtain points scattered throughout the game environment, while also paying enough attention to the road to alert the driver when there is an obstruction ahead. The overall goal is to amass as many points as possible while guiding the driver through pre-programmed scenarios.</a:t>
+            </a:r>
+          </a:p>
+        </p:txBody>
+      </p:sp>
+      <p:sp>
+        <p:nvSpPr>
+          <p:cNvPr id="4" name="Text Placeholder 3"/>
+          <p:cNvSpPr>
+            <a:spLocks noGrp="1"/>
+          </p:cNvSpPr>
+          <p:nvPr>
+            <p:ph type="body" sz="quarter" idx="11"/>
+          </p:nvPr>
+        </p:nvSpPr>
+        <p:spPr>
+          <a:xfrm>
+            <a:off x="527049" y="5276769"/>
+            <a:ext cx="10196513" cy="677100"/>
+          </a:xfrm>
+        </p:spPr>
+        <p:txBody>
+          <a:bodyPr/>
+          <a:lstStyle/>
+          <a:p>
+            <a:r>
+              <a:rPr lang="en-US" sz="3200" cap="small" dirty="0">
                 <a:latin typeface="Arial" pitchFamily="34" charset="0"/>
                 <a:cs typeface="Arial" pitchFamily="34" charset="0"/>
               </a:rPr>
-              <a:t>In the present day, virtual reality technology may seem expensive, and an unattractive paradigm for widespread, distributed use within a company as large as Erie Insurance. The Google Cardboard is the perfect solution. Cardboards are a cheap alternative to the expensive headsets that occupy the rest of the market, costing only $15 for one headset.</a:t>
-            </a:r>
-          </a:p>
-          <a:p>
-            <a:pPr algn="just"/>
-            <a:r>
-              <a:rPr lang="en-US" sz="3200" dirty="0" smtClean="0">
+              <a:t>Introduction</a:t>
+            </a:r>
+          </a:p>
+        </p:txBody>
+      </p:sp>
+      <p:sp>
+        <p:nvSpPr>
+          <p:cNvPr id="7" name="Text Placeholder 6"/>
+          <p:cNvSpPr>
+            <a:spLocks noGrp="1"/>
+          </p:cNvSpPr>
+          <p:nvPr>
+            <p:ph type="body" sz="quarter" idx="20"/>
+          </p:nvPr>
+        </p:nvSpPr>
+        <p:spPr>
+          <a:xfrm>
+            <a:off x="527049" y="19331509"/>
+            <a:ext cx="10210799" cy="677100"/>
+          </a:xfrm>
+        </p:spPr>
+        <p:txBody>
+          <a:bodyPr/>
+          <a:lstStyle/>
+          <a:p>
+            <a:r>
+              <a:rPr lang="en-US" sz="3200" cap="small" dirty="0">
                 <a:latin typeface="Arial" pitchFamily="34" charset="0"/>
                 <a:cs typeface="Arial" pitchFamily="34" charset="0"/>
               </a:rPr>
-              <a:t>To accomplis</a:t>
-            </a:r>
-            <a:r>
-              <a:rPr lang="en-US" sz="3200" dirty="0" smtClean="0">
-                <a:latin typeface="Arial" pitchFamily="34" charset="0"/>
-                <a:cs typeface="Arial" pitchFamily="34" charset="0"/>
-              </a:rPr>
-              <a:t>h this goal</a:t>
-            </a:r>
-            <a:r>
-              <a:rPr lang="en-US" sz="3200" dirty="0" smtClean="0">
-                <a:latin typeface="Arial" pitchFamily="34" charset="0"/>
-                <a:cs typeface="Arial" pitchFamily="34" charset="0"/>
-              </a:rPr>
-              <a:t>, </a:t>
-            </a:r>
-            <a:r>
-              <a:rPr lang="en-US" sz="3200" dirty="0" smtClean="0">
-                <a:latin typeface="Arial" pitchFamily="34" charset="0"/>
-                <a:cs typeface="Arial" pitchFamily="34" charset="0"/>
-              </a:rPr>
-              <a:t>our </a:t>
-            </a:r>
-            <a:r>
-              <a:rPr lang="en-US" sz="3200" dirty="0" smtClean="0">
-                <a:latin typeface="Arial" pitchFamily="34" charset="0"/>
-                <a:cs typeface="Arial" pitchFamily="34" charset="0"/>
-              </a:rPr>
-              <a:t>application</a:t>
-            </a:r>
-            <a:r>
-              <a:rPr lang="en-US" sz="3200" dirty="0" smtClean="0">
-                <a:latin typeface="Arial" pitchFamily="34" charset="0"/>
-                <a:cs typeface="Arial" pitchFamily="34" charset="0"/>
-              </a:rPr>
-              <a:t> puts the user in the passenger seat of a vehicle, being controlled by a driver engaging in distracted driving. Using a reticule located in the middle of the screen, the player must obtain points scattered throughout the game environment, while also paying enough attention to the road to alert the driver when there is an obstruction ahead. The overall goal is to amass as many points as possible while guiding the driver through pre-programmed scenarios.</a:t>
-            </a:r>
-            <a:endParaRPr lang="en-US" sz="3200" dirty="0" smtClean="0">
-              <a:latin typeface="Arial" pitchFamily="34" charset="0"/>
-              <a:cs typeface="Arial" pitchFamily="34" charset="0"/>
-            </a:endParaRPr>
-          </a:p>
-        </p:txBody>
-      </p:sp>
-      <p:sp>
-        <p:nvSpPr>
-          <p:cNvPr id="4" name="Text Placeholder 3"/>
-          <p:cNvSpPr>
-            <a:spLocks noGrp="1"/>
-          </p:cNvSpPr>
-          <p:nvPr>
-            <p:ph type="body" sz="quarter" idx="11"/>
-          </p:nvPr>
-        </p:nvSpPr>
-        <p:spPr>
-          <a:xfrm>
-            <a:off x="527049" y="5276769"/>
-            <a:ext cx="10196513" cy="677100"/>
-          </a:xfrm>
-        </p:spPr>
-        <p:txBody>
-          <a:bodyPr/>
-          <a:lstStyle/>
-          <a:p>
-            <a:r>
-              <a:rPr lang="en-US" sz="3200" cap="small" dirty="0" smtClean="0">
-                <a:latin typeface="Arial" pitchFamily="34" charset="0"/>
-                <a:cs typeface="Arial" pitchFamily="34" charset="0"/>
-              </a:rPr>
-              <a:t>Introduction</a:t>
-            </a:r>
-            <a:endParaRPr lang="en-US" sz="3200" cap="small" dirty="0">
-              <a:latin typeface="Arial" pitchFamily="34" charset="0"/>
-              <a:cs typeface="Arial" pitchFamily="34" charset="0"/>
-            </a:endParaRPr>
-          </a:p>
-        </p:txBody>
-      </p:sp>
-      <p:sp>
-        <p:nvSpPr>
-          <p:cNvPr id="7" name="Text Placeholder 6"/>
-          <p:cNvSpPr>
-            <a:spLocks noGrp="1"/>
-          </p:cNvSpPr>
-          <p:nvPr>
-            <p:ph type="body" sz="quarter" idx="20"/>
-          </p:nvPr>
-        </p:nvSpPr>
-        <p:spPr>
-          <a:xfrm>
-            <a:off x="527049" y="19331509"/>
-            <a:ext cx="10210799" cy="677100"/>
-          </a:xfrm>
-        </p:spPr>
-        <p:txBody>
-          <a:bodyPr/>
-          <a:lstStyle/>
-          <a:p>
-            <a:r>
-              <a:rPr lang="en-US" sz="3200" cap="small" dirty="0" smtClean="0">
-                <a:latin typeface="Arial" pitchFamily="34" charset="0"/>
-                <a:cs typeface="Arial" pitchFamily="34" charset="0"/>
-              </a:rPr>
               <a:t>Objectives</a:t>
             </a:r>
-            <a:endParaRPr lang="en-US" sz="3200" cap="small" dirty="0">
-              <a:latin typeface="Arial" pitchFamily="34" charset="0"/>
-              <a:cs typeface="Arial" pitchFamily="34" charset="0"/>
-            </a:endParaRPr>
           </a:p>
         </p:txBody>
       </p:sp>
@@ -5980,7 +5791,7 @@
               <a:buChar char="•"/>
             </a:pPr>
             <a:r>
-              <a:rPr lang="en-US" sz="3200" dirty="0" smtClean="0">
+              <a:rPr lang="en-US" sz="3200" dirty="0">
                 <a:latin typeface="Arial" pitchFamily="34" charset="0"/>
                 <a:cs typeface="Arial" pitchFamily="34" charset="0"/>
               </a:rPr>
@@ -5993,7 +5804,7 @@
               <a:buChar char="•"/>
             </a:pPr>
             <a:r>
-              <a:rPr lang="en-US" sz="3200" dirty="0" smtClean="0">
+              <a:rPr lang="en-US" sz="3200" dirty="0">
                 <a:latin typeface="Arial" pitchFamily="34" charset="0"/>
                 <a:cs typeface="Arial" pitchFamily="34" charset="0"/>
               </a:rPr>
@@ -6006,7 +5817,7 @@
               <a:buChar char="•"/>
             </a:pPr>
             <a:r>
-              <a:rPr lang="en-US" sz="3200" dirty="0" smtClean="0">
+              <a:rPr lang="en-US" sz="3200" dirty="0">
                 <a:latin typeface="Arial" pitchFamily="34" charset="0"/>
                 <a:cs typeface="Arial" pitchFamily="34" charset="0"/>
               </a:rPr>
@@ -6019,7 +5830,7 @@
               <a:buChar char="•"/>
             </a:pPr>
             <a:r>
-              <a:rPr lang="en-US" sz="3200" dirty="0" smtClean="0">
+              <a:rPr lang="en-US" sz="3200" dirty="0">
                 <a:latin typeface="Arial" pitchFamily="34" charset="0"/>
                 <a:cs typeface="Arial" pitchFamily="34" charset="0"/>
               </a:rPr>
@@ -6031,130 +5842,6 @@
               <a:buFont typeface="Arial" pitchFamily="34" charset="0"/>
               <a:buChar char="•"/>
             </a:pPr>
-            <a:endParaRPr lang="en-US" sz="2800" dirty="0" smtClean="0">
-              <a:latin typeface="Arial" pitchFamily="34" charset="0"/>
-              <a:cs typeface="Arial" pitchFamily="34" charset="0"/>
-            </a:endParaRPr>
-          </a:p>
-        </p:txBody>
-      </p:sp>
-      <p:sp>
-        <p:nvSpPr>
-          <p:cNvPr id="9" name="Text Placeholder 8"/>
-          <p:cNvSpPr>
-            <a:spLocks noGrp="1"/>
-          </p:cNvSpPr>
-          <p:nvPr>
-            <p:ph type="body" sz="quarter" idx="22"/>
-          </p:nvPr>
-        </p:nvSpPr>
-        <p:spPr>
-          <a:xfrm>
-            <a:off x="33174342" y="18992959"/>
-            <a:ext cx="10202507" cy="677100"/>
-          </a:xfrm>
-        </p:spPr>
-        <p:txBody>
-          <a:bodyPr/>
-          <a:lstStyle/>
-          <a:p>
-            <a:r>
-              <a:rPr lang="en-US" sz="3200" cap="small" dirty="0" smtClean="0">
-                <a:latin typeface="Arial" pitchFamily="34" charset="0"/>
-                <a:cs typeface="Arial" pitchFamily="34" charset="0"/>
-              </a:rPr>
-              <a:t>Third-Party Software</a:t>
-            </a:r>
-            <a:endParaRPr lang="en-US" sz="3200" cap="small" dirty="0">
-              <a:latin typeface="Arial" pitchFamily="34" charset="0"/>
-              <a:cs typeface="Arial" pitchFamily="34" charset="0"/>
-            </a:endParaRPr>
-          </a:p>
-        </p:txBody>
-      </p:sp>
-      <p:sp>
-        <p:nvSpPr>
-          <p:cNvPr id="10" name="Text Placeholder 9"/>
-          <p:cNvSpPr>
-            <a:spLocks noGrp="1"/>
-          </p:cNvSpPr>
-          <p:nvPr>
-            <p:ph type="body" sz="quarter" idx="23"/>
-          </p:nvPr>
-        </p:nvSpPr>
-        <p:spPr>
-          <a:xfrm>
-            <a:off x="11636493" y="14829763"/>
-            <a:ext cx="6170693" cy="10039649"/>
-          </a:xfrm>
-        </p:spPr>
-        <p:txBody>
-          <a:bodyPr/>
-          <a:lstStyle/>
-          <a:p>
-            <a:r>
-              <a:rPr lang="en-US" sz="3200" dirty="0" smtClean="0">
-                <a:latin typeface="Arial" pitchFamily="34" charset="0"/>
-                <a:cs typeface="Arial" pitchFamily="34" charset="0"/>
-              </a:rPr>
-              <a:t>The </a:t>
-            </a:r>
-            <a:r>
-              <a:rPr lang="en-US" sz="3200" dirty="0" smtClean="0">
-                <a:latin typeface="Arial" pitchFamily="34" charset="0"/>
-                <a:cs typeface="Arial" pitchFamily="34" charset="0"/>
-              </a:rPr>
-              <a:t>application,</a:t>
-            </a:r>
-            <a:r>
-              <a:rPr lang="en-US" sz="3200" dirty="0" smtClean="0">
-                <a:latin typeface="Arial" pitchFamily="34" charset="0"/>
-                <a:cs typeface="Arial" pitchFamily="34" charset="0"/>
-              </a:rPr>
-              <a:t> </a:t>
-            </a:r>
-            <a:r>
-              <a:rPr lang="en-US" sz="3200" dirty="0" smtClean="0">
-                <a:latin typeface="Arial" pitchFamily="34" charset="0"/>
-                <a:cs typeface="Arial" pitchFamily="34" charset="0"/>
-              </a:rPr>
-              <a:t>implemented in </a:t>
-            </a:r>
-            <a:r>
-              <a:rPr lang="en-US" sz="3200" dirty="0" smtClean="0">
-                <a:latin typeface="Arial" pitchFamily="34" charset="0"/>
-                <a:cs typeface="Arial" pitchFamily="34" charset="0"/>
-              </a:rPr>
-              <a:t>C# and Unity,</a:t>
-            </a:r>
-            <a:r>
-              <a:rPr lang="en-US" sz="3200" dirty="0" smtClean="0">
-                <a:latin typeface="Arial" pitchFamily="34" charset="0"/>
-                <a:cs typeface="Arial" pitchFamily="34" charset="0"/>
-              </a:rPr>
-              <a:t> gives the player control over the passenger of a vehicle being controlled by an AI driver, that follows a pre-generated path in each level. The player’s job is to gather all of the points scattered around each level and to also make sure that the AI driver notices and  avoids various situations on the road.</a:t>
-            </a:r>
-          </a:p>
-          <a:p>
-            <a:endParaRPr lang="en-US" sz="3200" dirty="0" smtClean="0">
-              <a:latin typeface="Arial" pitchFamily="34" charset="0"/>
-              <a:cs typeface="Arial" pitchFamily="34" charset="0"/>
-            </a:endParaRPr>
-          </a:p>
-          <a:p>
-            <a:r>
-              <a:rPr lang="en-US" sz="3200" dirty="0" smtClean="0">
-                <a:latin typeface="Arial" pitchFamily="34" charset="0"/>
-                <a:cs typeface="Arial" pitchFamily="34" charset="0"/>
-              </a:rPr>
-              <a:t>The overall goal is to gather as many points and avoid as many situations as possible, aiming for a perfect score across all three levels of the game.</a:t>
-            </a:r>
-            <a:endParaRPr lang="en-US" sz="3200" dirty="0" smtClean="0">
-              <a:latin typeface="Arial" pitchFamily="34" charset="0"/>
-              <a:cs typeface="Arial" pitchFamily="34" charset="0"/>
-            </a:endParaRPr>
-          </a:p>
-          <a:p>
             <a:endParaRPr lang="en-US" sz="2800" dirty="0">
               <a:latin typeface="Arial" pitchFamily="34" charset="0"/>
               <a:cs typeface="Arial" pitchFamily="34" charset="0"/>
@@ -6164,6 +5851,87 @@
       </p:sp>
       <p:sp>
         <p:nvSpPr>
+          <p:cNvPr id="9" name="Text Placeholder 8"/>
+          <p:cNvSpPr>
+            <a:spLocks noGrp="1"/>
+          </p:cNvSpPr>
+          <p:nvPr>
+            <p:ph type="body" sz="quarter" idx="22"/>
+          </p:nvPr>
+        </p:nvSpPr>
+        <p:spPr>
+          <a:xfrm>
+            <a:off x="33174342" y="18992959"/>
+            <a:ext cx="10202507" cy="677100"/>
+          </a:xfrm>
+        </p:spPr>
+        <p:txBody>
+          <a:bodyPr/>
+          <a:lstStyle/>
+          <a:p>
+            <a:r>
+              <a:rPr lang="en-US" sz="3200" cap="small" dirty="0">
+                <a:latin typeface="Arial" pitchFamily="34" charset="0"/>
+                <a:cs typeface="Arial" pitchFamily="34" charset="0"/>
+              </a:rPr>
+              <a:t>Third-Party Software</a:t>
+            </a:r>
+          </a:p>
+        </p:txBody>
+      </p:sp>
+      <p:sp>
+        <p:nvSpPr>
+          <p:cNvPr id="10" name="Text Placeholder 9"/>
+          <p:cNvSpPr>
+            <a:spLocks noGrp="1"/>
+          </p:cNvSpPr>
+          <p:nvPr>
+            <p:ph type="body" sz="quarter" idx="23"/>
+          </p:nvPr>
+        </p:nvSpPr>
+        <p:spPr>
+          <a:xfrm>
+            <a:off x="11636493" y="14829763"/>
+            <a:ext cx="6170693" cy="10039649"/>
+          </a:xfrm>
+        </p:spPr>
+        <p:txBody>
+          <a:bodyPr/>
+          <a:lstStyle/>
+          <a:p>
+            <a:r>
+              <a:rPr lang="en-US" sz="3200" dirty="0">
+                <a:latin typeface="Arial" pitchFamily="34" charset="0"/>
+                <a:cs typeface="Arial" pitchFamily="34" charset="0"/>
+              </a:rPr>
+              <a:t>The application, implemented in C# and Unity, gives the player control over the passenger of a vehicle being controlled by an AI driver, that follows a pre-generated path in each level. The player’s job is to gather all of the points scattered around each level and to also make sure that the AI driver notices and  avoids various situations on the road.</a:t>
+            </a:r>
+          </a:p>
+          <a:p>
+            <a:endParaRPr lang="en-US" sz="3200" dirty="0">
+              <a:latin typeface="Arial" pitchFamily="34" charset="0"/>
+              <a:cs typeface="Arial" pitchFamily="34" charset="0"/>
+            </a:endParaRPr>
+          </a:p>
+          <a:p>
+            <a:r>
+              <a:rPr lang="en-US" sz="3200" dirty="0">
+                <a:latin typeface="Arial" pitchFamily="34" charset="0"/>
+                <a:cs typeface="Arial" pitchFamily="34" charset="0"/>
+              </a:rPr>
+              <a:t>The overall goal is to gather as many points and avoid as many situations as possible, aiming for a perfect score across all three levels of the game.</a:t>
+            </a:r>
+          </a:p>
+          <a:p>
+            <a:endParaRPr lang="en-US" sz="2800" dirty="0">
+              <a:latin typeface="Arial" pitchFamily="34" charset="0"/>
+              <a:cs typeface="Arial" pitchFamily="34" charset="0"/>
+            </a:endParaRPr>
+          </a:p>
+        </p:txBody>
+      </p:sp>
+      <p:sp>
+        <p:nvSpPr>
           <p:cNvPr id="11" name="Text Placeholder 10"/>
           <p:cNvSpPr>
             <a:spLocks noGrp="1"/>
@@ -6183,14 +5951,11 @@
           <a:lstStyle/>
           <a:p>
             <a:r>
-              <a:rPr lang="en-US" sz="3200" cap="small" dirty="0" smtClean="0">
+              <a:rPr lang="en-US" sz="3200" cap="small" dirty="0">
                 <a:latin typeface="Arial" pitchFamily="34" charset="0"/>
               </a:rPr>
               <a:t>Resulting  Application</a:t>
             </a:r>
-            <a:endParaRPr lang="en-US" sz="3200" cap="small" dirty="0">
-              <a:latin typeface="Arial" pitchFamily="34" charset="0"/>
-            </a:endParaRPr>
           </a:p>
         </p:txBody>
       </p:sp>
@@ -6215,7 +5980,7 @@
           <a:lstStyle/>
           <a:p>
             <a:r>
-              <a:rPr lang="en-US" sz="3200" cap="small" dirty="0" smtClean="0">
+              <a:rPr lang="en-US" sz="3200" cap="small" dirty="0">
                 <a:latin typeface="Arial" pitchFamily="34" charset="0"/>
                 <a:cs typeface="Arial" pitchFamily="34" charset="0"/>
               </a:rPr>
@@ -6249,7 +6014,7 @@
               <a:buChar char="•"/>
             </a:pPr>
             <a:r>
-              <a:rPr lang="en-US" sz="3200" dirty="0" smtClean="0">
+              <a:rPr lang="en-US" sz="3200" dirty="0">
                 <a:latin typeface="Arial" pitchFamily="34" charset="0"/>
                 <a:cs typeface="Arial" pitchFamily="34" charset="0"/>
               </a:rPr>
@@ -6262,16 +6027,12 @@
               <a:buChar char="•"/>
             </a:pPr>
             <a:r>
-              <a:rPr lang="en-US" sz="3200" dirty="0" smtClean="0">
+              <a:rPr lang="en-US" sz="3200" dirty="0">
                 <a:latin typeface="Arial" pitchFamily="34" charset="0"/>
                 <a:cs typeface="Arial" pitchFamily="34" charset="0"/>
               </a:rPr>
               <a:t>Make the game fun and memorable for drivers so that they can more easily recall their discussion with their agent concerning distracted driving</a:t>
             </a:r>
-            <a:endParaRPr lang="en-US" sz="3200" dirty="0" smtClean="0">
-              <a:latin typeface="Arial" pitchFamily="34" charset="0"/>
-              <a:cs typeface="Arial" pitchFamily="34" charset="0"/>
-            </a:endParaRPr>
           </a:p>
         </p:txBody>
       </p:sp>
@@ -6627,7 +6388,7 @@
               <a:defRPr/>
             </a:pPr>
             <a:r>
-              <a:rPr lang="en-US" sz="8000" cap="small" dirty="0" smtClean="0">
+              <a:rPr lang="en-US" sz="8000" cap="small" dirty="0">
                 <a:solidFill>
                   <a:schemeClr val="accent6">
                     <a:lumMod val="40000"/>
@@ -6674,7 +6435,7 @@
           <a:p>
             <a:pPr algn="ctr"/>
             <a:r>
-              <a:rPr lang="en-US" sz="8000" cap="all" dirty="0" smtClean="0">
+              <a:rPr lang="en-US" sz="8000" cap="all" dirty="0">
                 <a:solidFill>
                   <a:schemeClr val="accent6">
                     <a:lumMod val="40000"/>
@@ -6719,19 +6480,7 @@
                 </a:solidFill>
                 <a:latin typeface="Arial Black" panose="020B0A04020102020204" pitchFamily="34" charset="0"/>
               </a:rPr>
-              <a:t> </a:t>
-            </a:r>
-            <a:r>
-              <a:rPr lang="en-US" sz="8000" dirty="0" smtClean="0">
-                <a:solidFill>
-                  <a:schemeClr val="accent6">
-                    <a:lumMod val="40000"/>
-                    <a:lumOff val="60000"/>
-                  </a:schemeClr>
-                </a:solidFill>
-                <a:latin typeface="Arial Black" panose="020B0A04020102020204" pitchFamily="34" charset="0"/>
-              </a:rPr>
-              <a:t>Engineering Design Conference</a:t>
+              <a:t> Engineering Design Conference</a:t>
             </a:r>
             <a:endParaRPr lang="en-US" sz="8000" cap="all" dirty="0">
               <a:solidFill>
@@ -6797,53 +6546,41 @@
           <a:lstStyle/>
           <a:p>
             <a:pPr algn="ctr"/>
-            <a:endParaRPr lang="en-US" sz="4400" b="1" cap="small" dirty="0" smtClean="0">
+            <a:endParaRPr lang="en-US" sz="4400" b="1" cap="small" dirty="0">
               <a:cs typeface="Arial" charset="0"/>
             </a:endParaRPr>
           </a:p>
           <a:p>
             <a:pPr algn="ctr"/>
             <a:r>
-              <a:rPr lang="en-US" sz="4400" b="1" cap="small" dirty="0" smtClean="0">
+              <a:rPr lang="en-US" sz="4400" b="1" cap="small" dirty="0">
                 <a:cs typeface="Arial" charset="0"/>
               </a:rPr>
               <a:t>Student Team:   Jacob Wheeler, Nathan Christiansen, and Nick </a:t>
             </a:r>
             <a:r>
-              <a:rPr lang="en-US" sz="4400" b="1" cap="small" dirty="0" err="1" smtClean="0">
+              <a:rPr lang="en-US" sz="4400" b="1" cap="small" dirty="0" err="1">
                 <a:cs typeface="Arial" charset="0"/>
               </a:rPr>
               <a:t>Kapty</a:t>
             </a:r>
-            <a:endParaRPr lang="en-US" sz="4400" b="1" cap="small" dirty="0" smtClean="0">
+            <a:endParaRPr lang="en-US" sz="4400" b="1" cap="small" dirty="0">
               <a:cs typeface="Arial" charset="0"/>
             </a:endParaRPr>
           </a:p>
           <a:p>
             <a:pPr algn="ctr"/>
             <a:r>
-              <a:rPr lang="en-US" sz="4000" i="1" cap="small" dirty="0" smtClean="0">
+              <a:rPr lang="en-US" sz="4000" i="1" cap="small" dirty="0">
                 <a:cs typeface="Arial" charset="0"/>
               </a:rPr>
               <a:t>Faculty Adviser:  Mr. George </a:t>
             </a:r>
             <a:r>
-              <a:rPr lang="en-US" sz="4000" i="1" cap="small" dirty="0" err="1" smtClean="0">
+              <a:rPr lang="en-US" sz="4000" i="1" cap="small" dirty="0" err="1">
                 <a:cs typeface="Arial" charset="0"/>
               </a:rPr>
               <a:t>Dudas</a:t>
-            </a:r>
-            <a:endParaRPr lang="en-US" sz="4000" i="1" cap="small" dirty="0" smtClean="0">
-              <a:cs typeface="Arial" charset="0"/>
-            </a:endParaRPr>
-          </a:p>
-          <a:p>
-            <a:pPr algn="ctr"/>
-            <a:r>
-              <a:rPr lang="en-US" sz="4000" i="1" cap="small" dirty="0" smtClean="0">
-                <a:cs typeface="Arial" charset="0"/>
-              </a:rPr>
-              <a:t>Industry Mentor:  Matthew Panetta</a:t>
             </a:r>
             <a:endParaRPr lang="en-US" sz="4000" i="1" cap="small" dirty="0">
               <a:cs typeface="Arial" charset="0"/>
@@ -6852,14 +6589,20 @@
           <a:p>
             <a:pPr algn="ctr"/>
             <a:r>
-              <a:rPr lang="en-US" sz="4000" i="1" cap="small" dirty="0" smtClean="0">
+              <a:rPr lang="en-US" sz="4000" i="1" cap="small" dirty="0">
                 <a:cs typeface="Arial" charset="0"/>
               </a:rPr>
+              <a:t>Industry Mentor:  Matthew Panetta</a:t>
+            </a:r>
+          </a:p>
+          <a:p>
+            <a:pPr algn="ctr"/>
+            <a:r>
+              <a:rPr lang="en-US" sz="4000" i="1" cap="small" dirty="0">
+                <a:cs typeface="Arial" charset="0"/>
+              </a:rPr>
               <a:t>Sponsored By: Erie Insurance</a:t>
             </a:r>
-            <a:endParaRPr lang="en-US" sz="4000" i="1" cap="small" dirty="0">
-              <a:cs typeface="Arial" charset="0"/>
-            </a:endParaRPr>
           </a:p>
         </p:txBody>
       </p:sp>
@@ -6892,7 +6635,7 @@
           <a:p>
             <a:pPr algn="ctr"/>
             <a:r>
-              <a:rPr lang="en-US" sz="3200" b="1" cap="small" dirty="0" smtClean="0">
+              <a:rPr lang="en-US" sz="3200" b="1" cap="small" dirty="0">
                 <a:latin typeface="Arial" pitchFamily="34" charset="0"/>
                 <a:cs typeface="Arial" pitchFamily="34" charset="0"/>
               </a:rPr>
@@ -6903,13 +6646,9 @@
             <a:pPr algn="just"/>
             <a:r>
               <a:rPr lang="en-US" sz="3200" dirty="0"/>
-              <a:t>Erie Insurance currently works with its agents to help them display the dangers of distracted driving to their policyholders. This can often be very difficult for agents to do since the user is not able to experience the consequences of distracted driving for themselves in a safe way. In order to help solve this problem for the agents, we are creating a virtual reality experience to allow for better engagement between agents and the teen drivers they work with. This virtual reality experience will utilize the Unity 3D engine and the Google Cardboard SDK to give the policyholder different scenarios in which they will have to make decisions in which they will have to prevent the driver from texting. This virtual reality experience will help the policyholder to understand how they can influence dangerous driving activities as well as to help stop them. The overall goal of this virtual reality experience is to give young drivers a fun, memorable experience with their agent and to help encourage them not to </a:t>
-            </a:r>
-            <a:r>
-              <a:rPr lang="en-US" sz="3200" dirty="0" smtClean="0"/>
-              <a:t>distract themselves by any means while driving.</a:t>
-            </a:r>
-            <a:endParaRPr lang="en-US" sz="3200" dirty="0" smtClean="0">
+              <a:t>Erie Insurance currently works with its agents to help them display the dangers of distracted driving to their policyholders. This can often be very difficult for agents to do since the user is not able to experience the consequences of distracted driving for themselves in a safe way. In order to help solve this problem for the agents, we are creating a virtual reality experience to allow for better engagement between agents and the teen drivers they work with. This virtual reality experience will utilize the Unity 3D engine and the Google Cardboard SDK to give the policyholder different scenarios in which they will have to make decisions by preventing the driver from texting. This virtual reality experience will help the policyholder to understand how they can influence dangerous driving activities as well as to help stop them. The overall goal of this virtual reality experience is to give young drivers a fun, memorable experience with their agent and to help encourage them not to distract themselves by any means while driving.</a:t>
+            </a:r>
+            <a:endParaRPr lang="en-US" sz="3200" dirty="0">
               <a:latin typeface="Arial" pitchFamily="34" charset="0"/>
               <a:cs typeface="Arial" pitchFamily="34" charset="0"/>
             </a:endParaRPr>
@@ -6937,16 +6676,12 @@
           <a:lstStyle/>
           <a:p>
             <a:r>
-              <a:rPr lang="en-US" sz="3200" cap="small" dirty="0" smtClean="0">
+              <a:rPr lang="en-US" sz="3200" cap="small" dirty="0">
                 <a:latin typeface="Arial" pitchFamily="34" charset="0"/>
                 <a:cs typeface="Arial" pitchFamily="34" charset="0"/>
               </a:rPr>
               <a:t>Author &amp; Abstract</a:t>
             </a:r>
-            <a:endParaRPr lang="en-US" sz="3200" cap="small" dirty="0">
-              <a:latin typeface="Arial" pitchFamily="34" charset="0"/>
-              <a:cs typeface="Arial" pitchFamily="34" charset="0"/>
-            </a:endParaRPr>
           </a:p>
         </p:txBody>
       </p:sp>
@@ -6990,7 +6725,7 @@
           <a:lstStyle/>
           <a:p>
             <a:r>
-              <a:rPr lang="en-US" sz="3200" cap="small" dirty="0" smtClean="0">
+              <a:rPr lang="en-US" sz="3200" cap="small" dirty="0">
                 <a:latin typeface="Arial" pitchFamily="34" charset="0"/>
                 <a:cs typeface="Arial" pitchFamily="34" charset="0"/>
               </a:rPr>
@@ -7022,37 +6757,12 @@
           <a:lstStyle/>
           <a:p>
             <a:r>
-              <a:rPr lang="en-US" sz="2000" b="1" dirty="0" smtClean="0">
+              <a:rPr lang="en-US" sz="2000" b="1" dirty="0">
                 <a:latin typeface="Arial" pitchFamily="34" charset="0"/>
                 <a:cs typeface="Arial" pitchFamily="34" charset="0"/>
               </a:rPr>
-              <a:t>Figure </a:t>
-            </a:r>
-            <a:r>
-              <a:rPr lang="en-US" sz="2000" b="1" dirty="0" smtClean="0">
-                <a:latin typeface="Arial" pitchFamily="34" charset="0"/>
-                <a:cs typeface="Arial" pitchFamily="34" charset="0"/>
-              </a:rPr>
-              <a:t>1: </a:t>
-            </a:r>
-            <a:r>
-              <a:rPr lang="en-US" sz="2000" b="1" dirty="0" smtClean="0">
-                <a:latin typeface="Arial" pitchFamily="34" charset="0"/>
-                <a:cs typeface="Arial" pitchFamily="34" charset="0"/>
-              </a:rPr>
-              <a:t>Sequence</a:t>
-            </a:r>
-            <a:r>
-              <a:rPr lang="en-US" sz="2000" b="1" dirty="0" smtClean="0">
-                <a:latin typeface="Arial" pitchFamily="34" charset="0"/>
-                <a:cs typeface="Arial" pitchFamily="34" charset="0"/>
-              </a:rPr>
-              <a:t> Diagram of Basic Game Flow</a:t>
-            </a:r>
-            <a:endParaRPr lang="en-US" sz="2000" b="1" dirty="0">
-              <a:latin typeface="Arial" pitchFamily="34" charset="0"/>
-              <a:cs typeface="Arial" pitchFamily="34" charset="0"/>
-            </a:endParaRPr>
+              <a:t>Figure 1: Sequence Diagram of Basic Game Flow</a:t>
+            </a:r>
           </a:p>
         </p:txBody>
       </p:sp>
@@ -7079,23 +6789,12 @@
           <a:lstStyle/>
           <a:p>
             <a:r>
-              <a:rPr lang="en-US" sz="2000" b="1" dirty="0" smtClean="0">
+              <a:rPr lang="en-US" sz="2000" b="1" dirty="0">
                 <a:latin typeface="Arial" pitchFamily="34" charset="0"/>
                 <a:cs typeface="Arial" pitchFamily="34" charset="0"/>
               </a:rPr>
-              <a:t>Figure </a:t>
-            </a:r>
-            <a:r>
-              <a:rPr lang="en-US" sz="2000" b="1" dirty="0" smtClean="0">
-                <a:latin typeface="Arial" pitchFamily="34" charset="0"/>
-                <a:cs typeface="Arial" pitchFamily="34" charset="0"/>
-              </a:rPr>
-              <a:t>3: Snapshot of Outer Space Environment </a:t>
-            </a:r>
-            <a:endParaRPr lang="en-US" sz="2000" b="1" dirty="0">
-              <a:latin typeface="Arial" pitchFamily="34" charset="0"/>
-              <a:cs typeface="Arial" pitchFamily="34" charset="0"/>
-            </a:endParaRPr>
+              <a:t>Figure 3: Snapshot of Outer Space Environment </a:t>
+            </a:r>
           </a:p>
         </p:txBody>
       </p:sp>
@@ -7122,37 +6821,12 @@
           <a:lstStyle/>
           <a:p>
             <a:r>
-              <a:rPr lang="en-US" sz="2000" b="1" dirty="0" smtClean="0">
+              <a:rPr lang="en-US" sz="2000" b="1" dirty="0">
                 <a:latin typeface="Arial" pitchFamily="34" charset="0"/>
                 <a:cs typeface="Arial" pitchFamily="34" charset="0"/>
               </a:rPr>
-              <a:t>Figure </a:t>
-            </a:r>
-            <a:r>
-              <a:rPr lang="en-US" sz="2000" b="1" dirty="0" smtClean="0">
-                <a:latin typeface="Arial" pitchFamily="34" charset="0"/>
-                <a:cs typeface="Arial" pitchFamily="34" charset="0"/>
-              </a:rPr>
-              <a:t>2: </a:t>
-            </a:r>
-            <a:r>
-              <a:rPr lang="en-US" sz="2000" b="1" dirty="0" smtClean="0">
-                <a:latin typeface="Arial" pitchFamily="34" charset="0"/>
-                <a:cs typeface="Arial" pitchFamily="34" charset="0"/>
-              </a:rPr>
-              <a:t> Distracted Driver, Points, and a Warning Sign</a:t>
-            </a:r>
-            <a:r>
-              <a:rPr lang="en-US" sz="2000" b="1" dirty="0" smtClean="0">
-                <a:latin typeface="Arial" pitchFamily="34" charset="0"/>
-                <a:cs typeface="Arial" pitchFamily="34" charset="0"/>
-              </a:rPr>
-              <a:t> </a:t>
-            </a:r>
-            <a:endParaRPr lang="en-US" sz="2000" b="1" dirty="0">
-              <a:latin typeface="Arial" pitchFamily="34" charset="0"/>
-              <a:cs typeface="Arial" pitchFamily="34" charset="0"/>
-            </a:endParaRPr>
+              <a:t>Figure 2:  Distracted Driver, Points, and a Warning Sign </a:t>
+            </a:r>
           </a:p>
         </p:txBody>
       </p:sp>
@@ -7179,23 +6853,12 @@
           <a:lstStyle/>
           <a:p>
             <a:r>
-              <a:rPr lang="en-US" sz="2000" b="1" dirty="0" smtClean="0">
+              <a:rPr lang="en-US" sz="2000" b="1" dirty="0">
                 <a:latin typeface="Arial" pitchFamily="34" charset="0"/>
                 <a:cs typeface="Arial" pitchFamily="34" charset="0"/>
               </a:rPr>
-              <a:t>Figure </a:t>
-            </a:r>
-            <a:r>
-              <a:rPr lang="en-US" sz="2000" b="1" dirty="0" smtClean="0">
-                <a:latin typeface="Arial" pitchFamily="34" charset="0"/>
-                <a:cs typeface="Arial" pitchFamily="34" charset="0"/>
-              </a:rPr>
-              <a:t>4: Snapshot of Temple Environment</a:t>
-            </a:r>
-            <a:endParaRPr lang="en-US" sz="2000" b="1" dirty="0">
-              <a:latin typeface="Arial" pitchFamily="34" charset="0"/>
-              <a:cs typeface="Arial" pitchFamily="34" charset="0"/>
-            </a:endParaRPr>
+              <a:t>Figure 4: Snapshot of Temple Environment</a:t>
+            </a:r>
           </a:p>
         </p:txBody>
       </p:sp>
@@ -7223,27 +6886,33 @@
           <a:p>
             <a:pPr algn="just"/>
             <a:r>
-              <a:rPr lang="en-US" sz="3200" dirty="0" smtClean="0">
-                <a:latin typeface="Arial" panose="020B0604020202020204" pitchFamily="34" charset="0"/>
-                <a:cs typeface="Arial" panose="020B0604020202020204" pitchFamily="34" charset="0"/>
-              </a:rPr>
-              <a:t>Currently</a:t>
-            </a:r>
-            <a:r>
               <a:rPr lang="en-US" sz="3200" dirty="0">
                 <a:latin typeface="Arial" panose="020B0604020202020204" pitchFamily="34" charset="0"/>
                 <a:cs typeface="Arial" panose="020B0604020202020204" pitchFamily="34" charset="0"/>
               </a:rPr>
-              <a:t>, it is very difficult to display the dangers of distracted driving to a younger generation in a way that engages them. Erie Insurance is seeking an innovative solution in order to solve this problem. The business sponsors of this project are interested in a product that allows for an open discussion on the dangers of texting and driving. While this project is not aimed at teaching policyholders to refrain from texting and driving, it will be used to help the agent share something fun while having that discussion with the young driver. </a:t>
-            </a:r>
-            <a:endParaRPr lang="en-US" sz="3200" dirty="0" smtClean="0">
+              <a:t>Currently, it is very difficult to display the dangers of distracted driving to a younger generation in a way that engages them. Erie Insurance is seeking an innovative solution in order to solve this problem. The business sponsors of this project are interested in a product that allows for an open discussion on the dangers of texting and driving. While this project is not aimed at teaching policyholders to refrain from texting and driving, it will be used to help the agent share something fun while having that discussion with the young driver. </a:t>
+            </a:r>
+          </a:p>
+          <a:p>
+            <a:pPr algn="just"/>
+            <a:endParaRPr lang="en-US" sz="3200" dirty="0">
               <a:latin typeface="Arial" panose="020B0604020202020204" pitchFamily="34" charset="0"/>
               <a:cs typeface="Arial" panose="020B0604020202020204" pitchFamily="34" charset="0"/>
             </a:endParaRPr>
           </a:p>
           <a:p>
             <a:pPr algn="just"/>
-            <a:endParaRPr lang="en-US" sz="3200" dirty="0" smtClean="0">
+            <a:r>
+              <a:rPr lang="en-US" sz="3200" dirty="0">
+                <a:latin typeface="Arial" panose="020B0604020202020204" pitchFamily="34" charset="0"/>
+                <a:cs typeface="Arial" panose="020B0604020202020204" pitchFamily="34" charset="0"/>
+              </a:rPr>
+              <a:t>This project aims to utilize virtual reality technology to create an immersive experience that engages users of all ages. The application will be distributed to agents around Erie's footprint and will effectively capture the younger audience. The business sponsors of the project need to ensure that young drivers remember the dangers of distracted driving that have been explained to them by their Erie Insurance agent, which is a gap that this project aims to fill.</a:t>
+            </a:r>
+          </a:p>
+          <a:p>
+            <a:pPr algn="just"/>
+            <a:endParaRPr lang="en-US" sz="3200" dirty="0">
               <a:latin typeface="Arial" panose="020B0604020202020204" pitchFamily="34" charset="0"/>
               <a:cs typeface="Arial" panose="020B0604020202020204" pitchFamily="34" charset="0"/>
             </a:endParaRPr>
@@ -7252,79 +6921,6 @@
             <a:pPr algn="just"/>
             <a:r>
               <a:rPr lang="en-US" sz="3200" dirty="0">
-                <a:latin typeface="Arial" panose="020B0604020202020204" pitchFamily="34" charset="0"/>
-                <a:cs typeface="Arial" panose="020B0604020202020204" pitchFamily="34" charset="0"/>
-              </a:rPr>
-              <a:t>This project aims to utilize virtual reality technology to create an immersive experience that engages users of all ages. The application will be distributed to agents around Erie's footprint and will effectively capture the younger audience. </a:t>
-            </a:r>
-            <a:r>
-              <a:rPr lang="en-US" sz="3200" dirty="0" smtClean="0">
-                <a:latin typeface="Arial" panose="020B0604020202020204" pitchFamily="34" charset="0"/>
-                <a:cs typeface="Arial" panose="020B0604020202020204" pitchFamily="34" charset="0"/>
-              </a:rPr>
-              <a:t>The </a:t>
-            </a:r>
-            <a:r>
-              <a:rPr lang="en-US" sz="3200" dirty="0">
-                <a:latin typeface="Arial" panose="020B0604020202020204" pitchFamily="34" charset="0"/>
-                <a:cs typeface="Arial" panose="020B0604020202020204" pitchFamily="34" charset="0"/>
-              </a:rPr>
-              <a:t>business sponsors of the project need </a:t>
-            </a:r>
-            <a:r>
-              <a:rPr lang="en-US" sz="3200" dirty="0" smtClean="0">
-                <a:latin typeface="Arial" panose="020B0604020202020204" pitchFamily="34" charset="0"/>
-                <a:cs typeface="Arial" panose="020B0604020202020204" pitchFamily="34" charset="0"/>
-              </a:rPr>
-              <a:t>to ensure that</a:t>
-            </a:r>
-            <a:r>
-              <a:rPr lang="en-US" sz="3200" dirty="0" smtClean="0">
-                <a:latin typeface="Arial" panose="020B0604020202020204" pitchFamily="34" charset="0"/>
-                <a:cs typeface="Arial" panose="020B0604020202020204" pitchFamily="34" charset="0"/>
-              </a:rPr>
-              <a:t> young </a:t>
-            </a:r>
-            <a:r>
-              <a:rPr lang="en-US" sz="3200" dirty="0">
-                <a:latin typeface="Arial" panose="020B0604020202020204" pitchFamily="34" charset="0"/>
-                <a:cs typeface="Arial" panose="020B0604020202020204" pitchFamily="34" charset="0"/>
-              </a:rPr>
-              <a:t>drivers remember the dangers of distracted driving that have been explained to them by their </a:t>
-            </a:r>
-            <a:r>
-              <a:rPr lang="en-US" sz="3200" dirty="0" smtClean="0">
-                <a:latin typeface="Arial" panose="020B0604020202020204" pitchFamily="34" charset="0"/>
-                <a:cs typeface="Arial" panose="020B0604020202020204" pitchFamily="34" charset="0"/>
-              </a:rPr>
-              <a:t>Erie Insurance agent</a:t>
-            </a:r>
-            <a:r>
-              <a:rPr lang="en-US" sz="3200" dirty="0">
-                <a:latin typeface="Arial" panose="020B0604020202020204" pitchFamily="34" charset="0"/>
-                <a:cs typeface="Arial" panose="020B0604020202020204" pitchFamily="34" charset="0"/>
-              </a:rPr>
-              <a:t>, which is a gap that this project aims to fill</a:t>
-            </a:r>
-            <a:r>
-              <a:rPr lang="en-US" sz="3200" dirty="0" smtClean="0">
-                <a:latin typeface="Arial" panose="020B0604020202020204" pitchFamily="34" charset="0"/>
-                <a:cs typeface="Arial" panose="020B0604020202020204" pitchFamily="34" charset="0"/>
-              </a:rPr>
-              <a:t>.</a:t>
-            </a:r>
-          </a:p>
-          <a:p>
-            <a:pPr algn="just"/>
-            <a:endParaRPr lang="en-US" sz="3200" dirty="0" smtClean="0">
-              <a:latin typeface="Arial" panose="020B0604020202020204" pitchFamily="34" charset="0"/>
-              <a:cs typeface="Arial" panose="020B0604020202020204" pitchFamily="34" charset="0"/>
-            </a:endParaRPr>
-          </a:p>
-          <a:p>
-            <a:pPr algn="just"/>
-            <a:r>
-              <a:rPr lang="en-US" sz="3200" dirty="0" smtClean="0">
                 <a:latin typeface="Arial" panose="020B0604020202020204" pitchFamily="34" charset="0"/>
                 <a:cs typeface="Arial" panose="020B0604020202020204" pitchFamily="34" charset="0"/>
               </a:rPr>
@@ -7360,56 +6956,27 @@
           <a:lstStyle/>
           <a:p>
             <a:r>
-              <a:rPr lang="en-US" sz="3200" dirty="0" smtClean="0">
+              <a:rPr lang="en-US" sz="3200" dirty="0">
                 <a:latin typeface="Arial" pitchFamily="34" charset="0"/>
                 <a:cs typeface="Arial" pitchFamily="34" charset="0"/>
               </a:rPr>
-              <a:t>Top</a:t>
-            </a:r>
-            <a:r>
-              <a:rPr lang="en-US" sz="3200" dirty="0" smtClean="0">
-                <a:latin typeface="Arial" pitchFamily="34" charset="0"/>
-                <a:cs typeface="Arial" pitchFamily="34" charset="0"/>
-              </a:rPr>
-              <a:t>: A </a:t>
-            </a:r>
-            <a:r>
-              <a:rPr lang="en-US" sz="3200" dirty="0" smtClean="0">
-                <a:latin typeface="Arial" pitchFamily="34" charset="0"/>
-                <a:cs typeface="Arial" pitchFamily="34" charset="0"/>
-              </a:rPr>
-              <a:t>split-</a:t>
-            </a:r>
-            <a:r>
-              <a:rPr lang="en-US" sz="3200" dirty="0" smtClean="0">
-                <a:latin typeface="Arial" pitchFamily="34" charset="0"/>
-                <a:cs typeface="Arial" pitchFamily="34" charset="0"/>
-              </a:rPr>
-              <a:t>view used with the cardboard showing an example of 3 point objects, the reticule, the distracted driver, and a scenario warning sign. </a:t>
-            </a:r>
-            <a:endParaRPr lang="en-US" sz="3200" dirty="0" smtClean="0">
-              <a:latin typeface="Arial" pitchFamily="34" charset="0"/>
-              <a:cs typeface="Arial" pitchFamily="34" charset="0"/>
-            </a:endParaRPr>
-          </a:p>
-          <a:p>
-            <a:endParaRPr lang="en-US" sz="3200" dirty="0" smtClean="0">
-              <a:latin typeface="Arial" pitchFamily="34" charset="0"/>
-              <a:cs typeface="Arial" pitchFamily="34" charset="0"/>
-            </a:endParaRPr>
-          </a:p>
-          <a:p>
-            <a:r>
-              <a:rPr lang="en-US" sz="3200" dirty="0" smtClean="0">
-                <a:latin typeface="Arial" pitchFamily="34" charset="0"/>
-                <a:cs typeface="Arial" pitchFamily="34" charset="0"/>
-              </a:rPr>
-              <a:t>Right and Left: Sample images of two of our three levels, Outer Space and the Lost Temple.</a:t>
-            </a:r>
+              <a:t>Top: A split-view used with the cardboard showing an example of 3 point objects, the reticule, the distracted driver, and a scenario warning sign. </a:t>
+            </a:r>
+          </a:p>
+          <a:p>
             <a:endParaRPr lang="en-US" sz="3200" dirty="0">
               <a:latin typeface="Arial" pitchFamily="34" charset="0"/>
               <a:cs typeface="Arial" pitchFamily="34" charset="0"/>
             </a:endParaRPr>
+          </a:p>
+          <a:p>
+            <a:r>
+              <a:rPr lang="en-US" sz="3200" dirty="0">
+                <a:latin typeface="Arial" pitchFamily="34" charset="0"/>
+                <a:cs typeface="Arial" pitchFamily="34" charset="0"/>
+              </a:rPr>
+              <a:t>Right and Left: Sample images of two of our three levels, Outer Space and the Lost Temple.</a:t>
+            </a:r>
           </a:p>
         </p:txBody>
       </p:sp>
@@ -7425,7 +6992,7 @@
           <a:blip r:embed="rId9" cstate="print">
             <a:extLst>
               <a:ext uri="{28A0092B-C50C-407E-A947-70E740481C1C}">
-                <a14:useLocalDpi xmlns:a14="http://schemas.microsoft.com/office/drawing/2010/main" xmlns="" val="0"/>
+                <a14:useLocalDpi xmlns:a14="http://schemas.microsoft.com/office/drawing/2010/main" val="0"/>
               </a:ext>
             </a:extLst>
           </a:blip>
@@ -7447,14 +7014,14 @@
           </a:ln>
           <a:extLst>
             <a:ext uri="{909E8E84-426E-40DD-AFC4-6F175D3DCCD1}">
-              <a14:hiddenFill xmlns:a14="http://schemas.microsoft.com/office/drawing/2010/main" xmlns="">
+              <a14:hiddenFill xmlns:a14="http://schemas.microsoft.com/office/drawing/2010/main">
                 <a:solidFill>
                   <a:srgbClr val="FFFFFF"/>
                 </a:solidFill>
               </a14:hiddenFill>
             </a:ext>
             <a:ext uri="{91240B29-F687-4F45-9708-019B960494DF}">
-              <a14:hiddenLine xmlns:a14="http://schemas.microsoft.com/office/drawing/2010/main" xmlns="" w="9525">
+              <a14:hiddenLine xmlns:a14="http://schemas.microsoft.com/office/drawing/2010/main" w="9525">
                 <a:solidFill>
                   <a:srgbClr val="000000"/>
                 </a:solidFill>
@@ -7556,7 +7123,7 @@
           <a:blip r:embed="rId10" cstate="print">
             <a:extLst>
               <a:ext uri="{28A0092B-C50C-407E-A947-70E740481C1C}">
-                <a14:useLocalDpi xmlns:a14="http://schemas.microsoft.com/office/drawing/2010/main" xmlns="" val="0"/>
+                <a14:useLocalDpi xmlns:a14="http://schemas.microsoft.com/office/drawing/2010/main" val="0"/>
               </a:ext>
             </a:extLst>
           </a:blip>
@@ -7586,7 +7153,7 @@
           <a:blip r:embed="rId11" cstate="print">
             <a:extLst>
               <a:ext uri="{28A0092B-C50C-407E-A947-70E740481C1C}">
-                <a14:useLocalDpi xmlns:a14="http://schemas.microsoft.com/office/drawing/2010/main" xmlns="" val="0"/>
+                <a14:useLocalDpi xmlns:a14="http://schemas.microsoft.com/office/drawing/2010/main" val="0"/>
               </a:ext>
             </a:extLst>
           </a:blip>
@@ -7621,7 +7188,7 @@
           <a:blip r:embed="rId12" cstate="print">
             <a:extLst>
               <a:ext uri="{28A0092B-C50C-407E-A947-70E740481C1C}">
-                <a14:useLocalDpi xmlns:a14="http://schemas.microsoft.com/office/drawing/2010/main" xmlns="" val="0"/>
+                <a14:useLocalDpi xmlns:a14="http://schemas.microsoft.com/office/drawing/2010/main" val="0"/>
               </a:ext>
             </a:extLst>
           </a:blip>
@@ -7656,7 +7223,7 @@
           <a:blip r:embed="rId13" cstate="print">
             <a:extLst>
               <a:ext uri="{28A0092B-C50C-407E-A947-70E740481C1C}">
-                <a14:useLocalDpi xmlns:a14="http://schemas.microsoft.com/office/drawing/2010/main" xmlns="" val="0"/>
+                <a14:useLocalDpi xmlns:a14="http://schemas.microsoft.com/office/drawing/2010/main" val="0"/>
               </a:ext>
             </a:extLst>
           </a:blip>
@@ -7762,13 +7329,6 @@
   <p:clrMapOvr>
     <a:masterClrMapping/>
   </p:clrMapOvr>
-  <p:timing>
-    <p:tnLst>
-      <p:par>
-        <p:cTn id="1" dur="indefinite" restart="never" nodeType="tmRoot"/>
-      </p:par>
-    </p:tnLst>
-  </p:timing>
 </p:sld>
 </file>
 

</xml_diff>